<commit_message>
update a figure for the paper
</commit_message>
<xml_diff>
--- a/SC2018/publications/1Dvs2D [Autosaved].pptx
+++ b/SC2018/publications/1Dvs2D [Autosaved].pptx
@@ -5,12 +5,13 @@
     <p:sldMasterId id="2147483648" r:id="rId1"/>
   </p:sldMasterIdLst>
   <p:notesMasterIdLst>
-    <p:notesMasterId r:id="rId5"/>
+    <p:notesMasterId r:id="rId6"/>
   </p:notesMasterIdLst>
   <p:sldIdLst>
-    <p:sldId id="256" r:id="rId2"/>
-    <p:sldId id="257" r:id="rId3"/>
-    <p:sldId id="258" r:id="rId4"/>
+    <p:sldId id="258" r:id="rId2"/>
+    <p:sldId id="259" r:id="rId3"/>
+    <p:sldId id="257" r:id="rId4"/>
+    <p:sldId id="256" r:id="rId5"/>
   </p:sldIdLst>
   <p:sldSz cx="12192000" cy="6858000"/>
   <p:notesSz cx="6858000" cy="9144000"/>
@@ -199,7 +200,7 @@
           <a:p>
             <a:fld id="{DCC31D73-B1D5-9841-86F8-B930AD81276A}" type="datetimeFigureOut">
               <a:rPr lang="en-US" smtClean="0"/>
-              <a:t>10/5/18</a:t>
+              <a:t>3/30/19</a:t>
             </a:fld>
             <a:endParaRPr lang="en-US"/>
           </a:p>
@@ -537,7 +538,7 @@
           <a:p>
             <a:fld id="{67ECD911-445B-6C49-8A12-BE7913D87AFE}" type="slidenum">
               <a:rPr lang="en-US" smtClean="0"/>
-              <a:t>1</a:t>
+              <a:t>4</a:t>
             </a:fld>
             <a:endParaRPr lang="en-US"/>
           </a:p>
@@ -578,7 +579,7 @@
           <p:cNvPr id="2" name="Title 1">
             <a:extLst>
               <a:ext uri="{FF2B5EF4-FFF2-40B4-BE49-F238E27FC236}">
-                <a16:creationId xmlns="" xmlns:a16="http://schemas.microsoft.com/office/drawing/2014/main" id="{36A11D78-74B9-E441-A3F3-21CE5BAD0432}"/>
+                <a16:creationId xmlns:a16="http://schemas.microsoft.com/office/drawing/2014/main" xmlns="" id="{36A11D78-74B9-E441-A3F3-21CE5BAD0432}"/>
               </a:ext>
             </a:extLst>
           </p:cNvPr>
@@ -615,7 +616,7 @@
           <p:cNvPr id="3" name="Subtitle 2">
             <a:extLst>
               <a:ext uri="{FF2B5EF4-FFF2-40B4-BE49-F238E27FC236}">
-                <a16:creationId xmlns="" xmlns:a16="http://schemas.microsoft.com/office/drawing/2014/main" id="{BCB2355A-4BFA-A841-9FC6-7A84B3E83FD7}"/>
+                <a16:creationId xmlns:a16="http://schemas.microsoft.com/office/drawing/2014/main" xmlns="" id="{BCB2355A-4BFA-A841-9FC6-7A84B3E83FD7}"/>
               </a:ext>
             </a:extLst>
           </p:cNvPr>
@@ -685,7 +686,7 @@
           <p:cNvPr id="4" name="Date Placeholder 3">
             <a:extLst>
               <a:ext uri="{FF2B5EF4-FFF2-40B4-BE49-F238E27FC236}">
-                <a16:creationId xmlns="" xmlns:a16="http://schemas.microsoft.com/office/drawing/2014/main" id="{B189E831-89E6-CF4D-BECF-F4C6A13EDBAC}"/>
+                <a16:creationId xmlns:a16="http://schemas.microsoft.com/office/drawing/2014/main" xmlns="" id="{B189E831-89E6-CF4D-BECF-F4C6A13EDBAC}"/>
               </a:ext>
             </a:extLst>
           </p:cNvPr>
@@ -703,7 +704,7 @@
           <a:p>
             <a:fld id="{EADC89E0-F5F8-6A4E-AED1-6ECC4C035956}" type="datetimeFigureOut">
               <a:rPr lang="en-US" smtClean="0"/>
-              <a:t>10/5/18</a:t>
+              <a:t>3/30/19</a:t>
             </a:fld>
             <a:endParaRPr lang="en-US"/>
           </a:p>
@@ -714,7 +715,7 @@
           <p:cNvPr id="5" name="Footer Placeholder 4">
             <a:extLst>
               <a:ext uri="{FF2B5EF4-FFF2-40B4-BE49-F238E27FC236}">
-                <a16:creationId xmlns="" xmlns:a16="http://schemas.microsoft.com/office/drawing/2014/main" id="{276DC49D-E24A-7246-8D2D-6AADC85CFA8C}"/>
+                <a16:creationId xmlns:a16="http://schemas.microsoft.com/office/drawing/2014/main" xmlns="" id="{276DC49D-E24A-7246-8D2D-6AADC85CFA8C}"/>
               </a:ext>
             </a:extLst>
           </p:cNvPr>
@@ -739,7 +740,7 @@
           <p:cNvPr id="6" name="Slide Number Placeholder 5">
             <a:extLst>
               <a:ext uri="{FF2B5EF4-FFF2-40B4-BE49-F238E27FC236}">
-                <a16:creationId xmlns="" xmlns:a16="http://schemas.microsoft.com/office/drawing/2014/main" id="{8459AA1C-A552-6449-9CDF-2ADAB4051582}"/>
+                <a16:creationId xmlns:a16="http://schemas.microsoft.com/office/drawing/2014/main" xmlns="" id="{8459AA1C-A552-6449-9CDF-2ADAB4051582}"/>
               </a:ext>
             </a:extLst>
           </p:cNvPr>
@@ -798,7 +799,7 @@
           <p:cNvPr id="2" name="Title 1">
             <a:extLst>
               <a:ext uri="{FF2B5EF4-FFF2-40B4-BE49-F238E27FC236}">
-                <a16:creationId xmlns="" xmlns:a16="http://schemas.microsoft.com/office/drawing/2014/main" id="{CAA7EE90-2C27-A44D-AE49-25298AA1C596}"/>
+                <a16:creationId xmlns:a16="http://schemas.microsoft.com/office/drawing/2014/main" xmlns="" id="{CAA7EE90-2C27-A44D-AE49-25298AA1C596}"/>
               </a:ext>
             </a:extLst>
           </p:cNvPr>
@@ -826,7 +827,7 @@
           <p:cNvPr id="3" name="Vertical Text Placeholder 2">
             <a:extLst>
               <a:ext uri="{FF2B5EF4-FFF2-40B4-BE49-F238E27FC236}">
-                <a16:creationId xmlns="" xmlns:a16="http://schemas.microsoft.com/office/drawing/2014/main" id="{926CEB37-AA94-C34D-ADEC-0BAF35E6D478}"/>
+                <a16:creationId xmlns:a16="http://schemas.microsoft.com/office/drawing/2014/main" xmlns="" id="{926CEB37-AA94-C34D-ADEC-0BAF35E6D478}"/>
               </a:ext>
             </a:extLst>
           </p:cNvPr>
@@ -883,7 +884,7 @@
           <p:cNvPr id="4" name="Date Placeholder 3">
             <a:extLst>
               <a:ext uri="{FF2B5EF4-FFF2-40B4-BE49-F238E27FC236}">
-                <a16:creationId xmlns="" xmlns:a16="http://schemas.microsoft.com/office/drawing/2014/main" id="{959F9B74-0489-E64E-BA1A-025A9D24449F}"/>
+                <a16:creationId xmlns:a16="http://schemas.microsoft.com/office/drawing/2014/main" xmlns="" id="{959F9B74-0489-E64E-BA1A-025A9D24449F}"/>
               </a:ext>
             </a:extLst>
           </p:cNvPr>
@@ -901,7 +902,7 @@
           <a:p>
             <a:fld id="{EADC89E0-F5F8-6A4E-AED1-6ECC4C035956}" type="datetimeFigureOut">
               <a:rPr lang="en-US" smtClean="0"/>
-              <a:t>10/5/18</a:t>
+              <a:t>3/30/19</a:t>
             </a:fld>
             <a:endParaRPr lang="en-US"/>
           </a:p>
@@ -912,7 +913,7 @@
           <p:cNvPr id="5" name="Footer Placeholder 4">
             <a:extLst>
               <a:ext uri="{FF2B5EF4-FFF2-40B4-BE49-F238E27FC236}">
-                <a16:creationId xmlns="" xmlns:a16="http://schemas.microsoft.com/office/drawing/2014/main" id="{B0ED5B73-054F-164B-81C1-3CAA9D2C3950}"/>
+                <a16:creationId xmlns:a16="http://schemas.microsoft.com/office/drawing/2014/main" xmlns="" id="{B0ED5B73-054F-164B-81C1-3CAA9D2C3950}"/>
               </a:ext>
             </a:extLst>
           </p:cNvPr>
@@ -937,7 +938,7 @@
           <p:cNvPr id="6" name="Slide Number Placeholder 5">
             <a:extLst>
               <a:ext uri="{FF2B5EF4-FFF2-40B4-BE49-F238E27FC236}">
-                <a16:creationId xmlns="" xmlns:a16="http://schemas.microsoft.com/office/drawing/2014/main" id="{DFDD103B-B0E3-CB49-8853-9F2B02611291}"/>
+                <a16:creationId xmlns:a16="http://schemas.microsoft.com/office/drawing/2014/main" xmlns="" id="{DFDD103B-B0E3-CB49-8853-9F2B02611291}"/>
               </a:ext>
             </a:extLst>
           </p:cNvPr>
@@ -996,7 +997,7 @@
           <p:cNvPr id="2" name="Vertical Title 1">
             <a:extLst>
               <a:ext uri="{FF2B5EF4-FFF2-40B4-BE49-F238E27FC236}">
-                <a16:creationId xmlns="" xmlns:a16="http://schemas.microsoft.com/office/drawing/2014/main" id="{A6507CD0-35FC-1140-A596-7F5A550F05E0}"/>
+                <a16:creationId xmlns:a16="http://schemas.microsoft.com/office/drawing/2014/main" xmlns="" id="{A6507CD0-35FC-1140-A596-7F5A550F05E0}"/>
               </a:ext>
             </a:extLst>
           </p:cNvPr>
@@ -1029,7 +1030,7 @@
           <p:cNvPr id="3" name="Vertical Text Placeholder 2">
             <a:extLst>
               <a:ext uri="{FF2B5EF4-FFF2-40B4-BE49-F238E27FC236}">
-                <a16:creationId xmlns="" xmlns:a16="http://schemas.microsoft.com/office/drawing/2014/main" id="{0FE95AAD-7F62-5949-9C17-C540C1C3D06B}"/>
+                <a16:creationId xmlns:a16="http://schemas.microsoft.com/office/drawing/2014/main" xmlns="" id="{0FE95AAD-7F62-5949-9C17-C540C1C3D06B}"/>
               </a:ext>
             </a:extLst>
           </p:cNvPr>
@@ -1091,7 +1092,7 @@
           <p:cNvPr id="4" name="Date Placeholder 3">
             <a:extLst>
               <a:ext uri="{FF2B5EF4-FFF2-40B4-BE49-F238E27FC236}">
-                <a16:creationId xmlns="" xmlns:a16="http://schemas.microsoft.com/office/drawing/2014/main" id="{DEB23565-78F1-5B4C-A49E-94B314ADD873}"/>
+                <a16:creationId xmlns:a16="http://schemas.microsoft.com/office/drawing/2014/main" xmlns="" id="{DEB23565-78F1-5B4C-A49E-94B314ADD873}"/>
               </a:ext>
             </a:extLst>
           </p:cNvPr>
@@ -1109,7 +1110,7 @@
           <a:p>
             <a:fld id="{EADC89E0-F5F8-6A4E-AED1-6ECC4C035956}" type="datetimeFigureOut">
               <a:rPr lang="en-US" smtClean="0"/>
-              <a:t>10/5/18</a:t>
+              <a:t>3/30/19</a:t>
             </a:fld>
             <a:endParaRPr lang="en-US"/>
           </a:p>
@@ -1120,7 +1121,7 @@
           <p:cNvPr id="5" name="Footer Placeholder 4">
             <a:extLst>
               <a:ext uri="{FF2B5EF4-FFF2-40B4-BE49-F238E27FC236}">
-                <a16:creationId xmlns="" xmlns:a16="http://schemas.microsoft.com/office/drawing/2014/main" id="{D32ECAF1-9626-0348-B347-5C3200860B2D}"/>
+                <a16:creationId xmlns:a16="http://schemas.microsoft.com/office/drawing/2014/main" xmlns="" id="{D32ECAF1-9626-0348-B347-5C3200860B2D}"/>
               </a:ext>
             </a:extLst>
           </p:cNvPr>
@@ -1145,7 +1146,7 @@
           <p:cNvPr id="6" name="Slide Number Placeholder 5">
             <a:extLst>
               <a:ext uri="{FF2B5EF4-FFF2-40B4-BE49-F238E27FC236}">
-                <a16:creationId xmlns="" xmlns:a16="http://schemas.microsoft.com/office/drawing/2014/main" id="{73DF7057-CCC3-0947-A24A-2D50235E9D0B}"/>
+                <a16:creationId xmlns:a16="http://schemas.microsoft.com/office/drawing/2014/main" xmlns="" id="{73DF7057-CCC3-0947-A24A-2D50235E9D0B}"/>
               </a:ext>
             </a:extLst>
           </p:cNvPr>
@@ -1204,7 +1205,7 @@
           <p:cNvPr id="2" name="Title 1">
             <a:extLst>
               <a:ext uri="{FF2B5EF4-FFF2-40B4-BE49-F238E27FC236}">
-                <a16:creationId xmlns="" xmlns:a16="http://schemas.microsoft.com/office/drawing/2014/main" id="{967144A0-9129-F74E-82FB-57978E016A85}"/>
+                <a16:creationId xmlns:a16="http://schemas.microsoft.com/office/drawing/2014/main" xmlns="" id="{967144A0-9129-F74E-82FB-57978E016A85}"/>
               </a:ext>
             </a:extLst>
           </p:cNvPr>
@@ -1232,7 +1233,7 @@
           <p:cNvPr id="3" name="Content Placeholder 2">
             <a:extLst>
               <a:ext uri="{FF2B5EF4-FFF2-40B4-BE49-F238E27FC236}">
-                <a16:creationId xmlns="" xmlns:a16="http://schemas.microsoft.com/office/drawing/2014/main" id="{EBAC2B10-336A-2745-BB39-FFEEEBEBD833}"/>
+                <a16:creationId xmlns:a16="http://schemas.microsoft.com/office/drawing/2014/main" xmlns="" id="{EBAC2B10-336A-2745-BB39-FFEEEBEBD833}"/>
               </a:ext>
             </a:extLst>
           </p:cNvPr>
@@ -1289,7 +1290,7 @@
           <p:cNvPr id="4" name="Date Placeholder 3">
             <a:extLst>
               <a:ext uri="{FF2B5EF4-FFF2-40B4-BE49-F238E27FC236}">
-                <a16:creationId xmlns="" xmlns:a16="http://schemas.microsoft.com/office/drawing/2014/main" id="{D9A53527-1D5F-5145-BDD4-2F606E8265C8}"/>
+                <a16:creationId xmlns:a16="http://schemas.microsoft.com/office/drawing/2014/main" xmlns="" id="{D9A53527-1D5F-5145-BDD4-2F606E8265C8}"/>
               </a:ext>
             </a:extLst>
           </p:cNvPr>
@@ -1307,7 +1308,7 @@
           <a:p>
             <a:fld id="{EADC89E0-F5F8-6A4E-AED1-6ECC4C035956}" type="datetimeFigureOut">
               <a:rPr lang="en-US" smtClean="0"/>
-              <a:t>10/5/18</a:t>
+              <a:t>3/30/19</a:t>
             </a:fld>
             <a:endParaRPr lang="en-US"/>
           </a:p>
@@ -1318,7 +1319,7 @@
           <p:cNvPr id="5" name="Footer Placeholder 4">
             <a:extLst>
               <a:ext uri="{FF2B5EF4-FFF2-40B4-BE49-F238E27FC236}">
-                <a16:creationId xmlns="" xmlns:a16="http://schemas.microsoft.com/office/drawing/2014/main" id="{8B913D65-C27A-E84A-A4F0-C3BB6506D8AC}"/>
+                <a16:creationId xmlns:a16="http://schemas.microsoft.com/office/drawing/2014/main" xmlns="" id="{8B913D65-C27A-E84A-A4F0-C3BB6506D8AC}"/>
               </a:ext>
             </a:extLst>
           </p:cNvPr>
@@ -1343,7 +1344,7 @@
           <p:cNvPr id="6" name="Slide Number Placeholder 5">
             <a:extLst>
               <a:ext uri="{FF2B5EF4-FFF2-40B4-BE49-F238E27FC236}">
-                <a16:creationId xmlns="" xmlns:a16="http://schemas.microsoft.com/office/drawing/2014/main" id="{782F942E-577F-694D-B245-81059D2EB493}"/>
+                <a16:creationId xmlns:a16="http://schemas.microsoft.com/office/drawing/2014/main" xmlns="" id="{782F942E-577F-694D-B245-81059D2EB493}"/>
               </a:ext>
             </a:extLst>
           </p:cNvPr>
@@ -1402,7 +1403,7 @@
           <p:cNvPr id="2" name="Title 1">
             <a:extLst>
               <a:ext uri="{FF2B5EF4-FFF2-40B4-BE49-F238E27FC236}">
-                <a16:creationId xmlns="" xmlns:a16="http://schemas.microsoft.com/office/drawing/2014/main" id="{6DB5413B-8FEF-5146-B589-E8019C495C7C}"/>
+                <a16:creationId xmlns:a16="http://schemas.microsoft.com/office/drawing/2014/main" xmlns="" id="{6DB5413B-8FEF-5146-B589-E8019C495C7C}"/>
               </a:ext>
             </a:extLst>
           </p:cNvPr>
@@ -1439,7 +1440,7 @@
           <p:cNvPr id="3" name="Text Placeholder 2">
             <a:extLst>
               <a:ext uri="{FF2B5EF4-FFF2-40B4-BE49-F238E27FC236}">
-                <a16:creationId xmlns="" xmlns:a16="http://schemas.microsoft.com/office/drawing/2014/main" id="{0616819A-6BD1-284E-BC56-98E6E5FD6483}"/>
+                <a16:creationId xmlns:a16="http://schemas.microsoft.com/office/drawing/2014/main" xmlns="" id="{0616819A-6BD1-284E-BC56-98E6E5FD6483}"/>
               </a:ext>
             </a:extLst>
           </p:cNvPr>
@@ -1564,7 +1565,7 @@
           <p:cNvPr id="4" name="Date Placeholder 3">
             <a:extLst>
               <a:ext uri="{FF2B5EF4-FFF2-40B4-BE49-F238E27FC236}">
-                <a16:creationId xmlns="" xmlns:a16="http://schemas.microsoft.com/office/drawing/2014/main" id="{6BE85AF6-375A-C245-B0F6-EDE2CBD31397}"/>
+                <a16:creationId xmlns:a16="http://schemas.microsoft.com/office/drawing/2014/main" xmlns="" id="{6BE85AF6-375A-C245-B0F6-EDE2CBD31397}"/>
               </a:ext>
             </a:extLst>
           </p:cNvPr>
@@ -1582,7 +1583,7 @@
           <a:p>
             <a:fld id="{EADC89E0-F5F8-6A4E-AED1-6ECC4C035956}" type="datetimeFigureOut">
               <a:rPr lang="en-US" smtClean="0"/>
-              <a:t>10/5/18</a:t>
+              <a:t>3/30/19</a:t>
             </a:fld>
             <a:endParaRPr lang="en-US"/>
           </a:p>
@@ -1593,7 +1594,7 @@
           <p:cNvPr id="5" name="Footer Placeholder 4">
             <a:extLst>
               <a:ext uri="{FF2B5EF4-FFF2-40B4-BE49-F238E27FC236}">
-                <a16:creationId xmlns="" xmlns:a16="http://schemas.microsoft.com/office/drawing/2014/main" id="{6160491E-919B-3440-8A73-F1F6CC005264}"/>
+                <a16:creationId xmlns:a16="http://schemas.microsoft.com/office/drawing/2014/main" xmlns="" id="{6160491E-919B-3440-8A73-F1F6CC005264}"/>
               </a:ext>
             </a:extLst>
           </p:cNvPr>
@@ -1618,7 +1619,7 @@
           <p:cNvPr id="6" name="Slide Number Placeholder 5">
             <a:extLst>
               <a:ext uri="{FF2B5EF4-FFF2-40B4-BE49-F238E27FC236}">
-                <a16:creationId xmlns="" xmlns:a16="http://schemas.microsoft.com/office/drawing/2014/main" id="{688ADBBE-52FA-FA49-9317-6EB7D31C5B62}"/>
+                <a16:creationId xmlns:a16="http://schemas.microsoft.com/office/drawing/2014/main" xmlns="" id="{688ADBBE-52FA-FA49-9317-6EB7D31C5B62}"/>
               </a:ext>
             </a:extLst>
           </p:cNvPr>
@@ -1677,7 +1678,7 @@
           <p:cNvPr id="2" name="Title 1">
             <a:extLst>
               <a:ext uri="{FF2B5EF4-FFF2-40B4-BE49-F238E27FC236}">
-                <a16:creationId xmlns="" xmlns:a16="http://schemas.microsoft.com/office/drawing/2014/main" id="{B6F807F8-2311-394E-AC6B-AA3D75C6035D}"/>
+                <a16:creationId xmlns:a16="http://schemas.microsoft.com/office/drawing/2014/main" xmlns="" id="{B6F807F8-2311-394E-AC6B-AA3D75C6035D}"/>
               </a:ext>
             </a:extLst>
           </p:cNvPr>
@@ -1705,7 +1706,7 @@
           <p:cNvPr id="3" name="Content Placeholder 2">
             <a:extLst>
               <a:ext uri="{FF2B5EF4-FFF2-40B4-BE49-F238E27FC236}">
-                <a16:creationId xmlns="" xmlns:a16="http://schemas.microsoft.com/office/drawing/2014/main" id="{8B97B1C5-2A32-A148-A737-1320F5B67366}"/>
+                <a16:creationId xmlns:a16="http://schemas.microsoft.com/office/drawing/2014/main" xmlns="" id="{8B97B1C5-2A32-A148-A737-1320F5B67366}"/>
               </a:ext>
             </a:extLst>
           </p:cNvPr>
@@ -1767,7 +1768,7 @@
           <p:cNvPr id="4" name="Content Placeholder 3">
             <a:extLst>
               <a:ext uri="{FF2B5EF4-FFF2-40B4-BE49-F238E27FC236}">
-                <a16:creationId xmlns="" xmlns:a16="http://schemas.microsoft.com/office/drawing/2014/main" id="{CA402613-31F0-CB41-BA6A-7A098A56A9D2}"/>
+                <a16:creationId xmlns:a16="http://schemas.microsoft.com/office/drawing/2014/main" xmlns="" id="{CA402613-31F0-CB41-BA6A-7A098A56A9D2}"/>
               </a:ext>
             </a:extLst>
           </p:cNvPr>
@@ -1829,7 +1830,7 @@
           <p:cNvPr id="5" name="Date Placeholder 4">
             <a:extLst>
               <a:ext uri="{FF2B5EF4-FFF2-40B4-BE49-F238E27FC236}">
-                <a16:creationId xmlns="" xmlns:a16="http://schemas.microsoft.com/office/drawing/2014/main" id="{DC619388-32BA-D746-828D-157711A68006}"/>
+                <a16:creationId xmlns:a16="http://schemas.microsoft.com/office/drawing/2014/main" xmlns="" id="{DC619388-32BA-D746-828D-157711A68006}"/>
               </a:ext>
             </a:extLst>
           </p:cNvPr>
@@ -1847,7 +1848,7 @@
           <a:p>
             <a:fld id="{EADC89E0-F5F8-6A4E-AED1-6ECC4C035956}" type="datetimeFigureOut">
               <a:rPr lang="en-US" smtClean="0"/>
-              <a:t>10/5/18</a:t>
+              <a:t>3/30/19</a:t>
             </a:fld>
             <a:endParaRPr lang="en-US"/>
           </a:p>
@@ -1858,7 +1859,7 @@
           <p:cNvPr id="6" name="Footer Placeholder 5">
             <a:extLst>
               <a:ext uri="{FF2B5EF4-FFF2-40B4-BE49-F238E27FC236}">
-                <a16:creationId xmlns="" xmlns:a16="http://schemas.microsoft.com/office/drawing/2014/main" id="{6D5A0076-50B7-2A42-B856-8F9352EC033A}"/>
+                <a16:creationId xmlns:a16="http://schemas.microsoft.com/office/drawing/2014/main" xmlns="" id="{6D5A0076-50B7-2A42-B856-8F9352EC033A}"/>
               </a:ext>
             </a:extLst>
           </p:cNvPr>
@@ -1883,7 +1884,7 @@
           <p:cNvPr id="7" name="Slide Number Placeholder 6">
             <a:extLst>
               <a:ext uri="{FF2B5EF4-FFF2-40B4-BE49-F238E27FC236}">
-                <a16:creationId xmlns="" xmlns:a16="http://schemas.microsoft.com/office/drawing/2014/main" id="{7AB20381-3373-3D48-8E85-C76D9DDE9C8E}"/>
+                <a16:creationId xmlns:a16="http://schemas.microsoft.com/office/drawing/2014/main" xmlns="" id="{7AB20381-3373-3D48-8E85-C76D9DDE9C8E}"/>
               </a:ext>
             </a:extLst>
           </p:cNvPr>
@@ -1942,7 +1943,7 @@
           <p:cNvPr id="2" name="Title 1">
             <a:extLst>
               <a:ext uri="{FF2B5EF4-FFF2-40B4-BE49-F238E27FC236}">
-                <a16:creationId xmlns="" xmlns:a16="http://schemas.microsoft.com/office/drawing/2014/main" id="{EF4A0180-15C0-0D4D-8553-5C94A1231D04}"/>
+                <a16:creationId xmlns:a16="http://schemas.microsoft.com/office/drawing/2014/main" xmlns="" id="{EF4A0180-15C0-0D4D-8553-5C94A1231D04}"/>
               </a:ext>
             </a:extLst>
           </p:cNvPr>
@@ -1975,7 +1976,7 @@
           <p:cNvPr id="3" name="Text Placeholder 2">
             <a:extLst>
               <a:ext uri="{FF2B5EF4-FFF2-40B4-BE49-F238E27FC236}">
-                <a16:creationId xmlns="" xmlns:a16="http://schemas.microsoft.com/office/drawing/2014/main" id="{9AC159E4-8DDF-3449-BEE3-5AB320A119F3}"/>
+                <a16:creationId xmlns:a16="http://schemas.microsoft.com/office/drawing/2014/main" xmlns="" id="{9AC159E4-8DDF-3449-BEE3-5AB320A119F3}"/>
               </a:ext>
             </a:extLst>
           </p:cNvPr>
@@ -2046,7 +2047,7 @@
           <p:cNvPr id="4" name="Content Placeholder 3">
             <a:extLst>
               <a:ext uri="{FF2B5EF4-FFF2-40B4-BE49-F238E27FC236}">
-                <a16:creationId xmlns="" xmlns:a16="http://schemas.microsoft.com/office/drawing/2014/main" id="{CCB9AE50-8D7A-C644-8679-2FFCED11AE06}"/>
+                <a16:creationId xmlns:a16="http://schemas.microsoft.com/office/drawing/2014/main" xmlns="" id="{CCB9AE50-8D7A-C644-8679-2FFCED11AE06}"/>
               </a:ext>
             </a:extLst>
           </p:cNvPr>
@@ -2108,7 +2109,7 @@
           <p:cNvPr id="5" name="Text Placeholder 4">
             <a:extLst>
               <a:ext uri="{FF2B5EF4-FFF2-40B4-BE49-F238E27FC236}">
-                <a16:creationId xmlns="" xmlns:a16="http://schemas.microsoft.com/office/drawing/2014/main" id="{71665C89-7A1E-AC4A-A509-606B17CE35A3}"/>
+                <a16:creationId xmlns:a16="http://schemas.microsoft.com/office/drawing/2014/main" xmlns="" id="{71665C89-7A1E-AC4A-A509-606B17CE35A3}"/>
               </a:ext>
             </a:extLst>
           </p:cNvPr>
@@ -2179,7 +2180,7 @@
           <p:cNvPr id="6" name="Content Placeholder 5">
             <a:extLst>
               <a:ext uri="{FF2B5EF4-FFF2-40B4-BE49-F238E27FC236}">
-                <a16:creationId xmlns="" xmlns:a16="http://schemas.microsoft.com/office/drawing/2014/main" id="{2CD6EBE9-49AA-7D44-A361-FBB2D1835DDC}"/>
+                <a16:creationId xmlns:a16="http://schemas.microsoft.com/office/drawing/2014/main" xmlns="" id="{2CD6EBE9-49AA-7D44-A361-FBB2D1835DDC}"/>
               </a:ext>
             </a:extLst>
           </p:cNvPr>
@@ -2241,7 +2242,7 @@
           <p:cNvPr id="7" name="Date Placeholder 6">
             <a:extLst>
               <a:ext uri="{FF2B5EF4-FFF2-40B4-BE49-F238E27FC236}">
-                <a16:creationId xmlns="" xmlns:a16="http://schemas.microsoft.com/office/drawing/2014/main" id="{4B6807EF-9A22-C247-B9C1-7BF66394F357}"/>
+                <a16:creationId xmlns:a16="http://schemas.microsoft.com/office/drawing/2014/main" xmlns="" id="{4B6807EF-9A22-C247-B9C1-7BF66394F357}"/>
               </a:ext>
             </a:extLst>
           </p:cNvPr>
@@ -2259,7 +2260,7 @@
           <a:p>
             <a:fld id="{EADC89E0-F5F8-6A4E-AED1-6ECC4C035956}" type="datetimeFigureOut">
               <a:rPr lang="en-US" smtClean="0"/>
-              <a:t>10/5/18</a:t>
+              <a:t>3/30/19</a:t>
             </a:fld>
             <a:endParaRPr lang="en-US"/>
           </a:p>
@@ -2270,7 +2271,7 @@
           <p:cNvPr id="8" name="Footer Placeholder 7">
             <a:extLst>
               <a:ext uri="{FF2B5EF4-FFF2-40B4-BE49-F238E27FC236}">
-                <a16:creationId xmlns="" xmlns:a16="http://schemas.microsoft.com/office/drawing/2014/main" id="{92869A89-EF93-A246-88C8-6E31045D21A7}"/>
+                <a16:creationId xmlns:a16="http://schemas.microsoft.com/office/drawing/2014/main" xmlns="" id="{92869A89-EF93-A246-88C8-6E31045D21A7}"/>
               </a:ext>
             </a:extLst>
           </p:cNvPr>
@@ -2295,7 +2296,7 @@
           <p:cNvPr id="9" name="Slide Number Placeholder 8">
             <a:extLst>
               <a:ext uri="{FF2B5EF4-FFF2-40B4-BE49-F238E27FC236}">
-                <a16:creationId xmlns="" xmlns:a16="http://schemas.microsoft.com/office/drawing/2014/main" id="{F78C4803-9FEB-B541-831B-E00EA9C98974}"/>
+                <a16:creationId xmlns:a16="http://schemas.microsoft.com/office/drawing/2014/main" xmlns="" id="{F78C4803-9FEB-B541-831B-E00EA9C98974}"/>
               </a:ext>
             </a:extLst>
           </p:cNvPr>
@@ -2354,7 +2355,7 @@
           <p:cNvPr id="2" name="Title 1">
             <a:extLst>
               <a:ext uri="{FF2B5EF4-FFF2-40B4-BE49-F238E27FC236}">
-                <a16:creationId xmlns="" xmlns:a16="http://schemas.microsoft.com/office/drawing/2014/main" id="{83FD602E-697D-4648-87B1-37D2DD9D76EC}"/>
+                <a16:creationId xmlns:a16="http://schemas.microsoft.com/office/drawing/2014/main" xmlns="" id="{83FD602E-697D-4648-87B1-37D2DD9D76EC}"/>
               </a:ext>
             </a:extLst>
           </p:cNvPr>
@@ -2382,7 +2383,7 @@
           <p:cNvPr id="3" name="Date Placeholder 2">
             <a:extLst>
               <a:ext uri="{FF2B5EF4-FFF2-40B4-BE49-F238E27FC236}">
-                <a16:creationId xmlns="" xmlns:a16="http://schemas.microsoft.com/office/drawing/2014/main" id="{087DD02C-BF0A-3C45-8068-B639F8701236}"/>
+                <a16:creationId xmlns:a16="http://schemas.microsoft.com/office/drawing/2014/main" xmlns="" id="{087DD02C-BF0A-3C45-8068-B639F8701236}"/>
               </a:ext>
             </a:extLst>
           </p:cNvPr>
@@ -2400,7 +2401,7 @@
           <a:p>
             <a:fld id="{EADC89E0-F5F8-6A4E-AED1-6ECC4C035956}" type="datetimeFigureOut">
               <a:rPr lang="en-US" smtClean="0"/>
-              <a:t>10/5/18</a:t>
+              <a:t>3/30/19</a:t>
             </a:fld>
             <a:endParaRPr lang="en-US"/>
           </a:p>
@@ -2411,7 +2412,7 @@
           <p:cNvPr id="4" name="Footer Placeholder 3">
             <a:extLst>
               <a:ext uri="{FF2B5EF4-FFF2-40B4-BE49-F238E27FC236}">
-                <a16:creationId xmlns="" xmlns:a16="http://schemas.microsoft.com/office/drawing/2014/main" id="{6563C336-7A9A-224B-9F4D-FBFCFEE5F31B}"/>
+                <a16:creationId xmlns:a16="http://schemas.microsoft.com/office/drawing/2014/main" xmlns="" id="{6563C336-7A9A-224B-9F4D-FBFCFEE5F31B}"/>
               </a:ext>
             </a:extLst>
           </p:cNvPr>
@@ -2436,7 +2437,7 @@
           <p:cNvPr id="5" name="Slide Number Placeholder 4">
             <a:extLst>
               <a:ext uri="{FF2B5EF4-FFF2-40B4-BE49-F238E27FC236}">
-                <a16:creationId xmlns="" xmlns:a16="http://schemas.microsoft.com/office/drawing/2014/main" id="{E3559608-14A1-C644-B86A-DDBA24D7B9A7}"/>
+                <a16:creationId xmlns:a16="http://schemas.microsoft.com/office/drawing/2014/main" xmlns="" id="{E3559608-14A1-C644-B86A-DDBA24D7B9A7}"/>
               </a:ext>
             </a:extLst>
           </p:cNvPr>
@@ -2495,7 +2496,7 @@
           <p:cNvPr id="2" name="Date Placeholder 1">
             <a:extLst>
               <a:ext uri="{FF2B5EF4-FFF2-40B4-BE49-F238E27FC236}">
-                <a16:creationId xmlns="" xmlns:a16="http://schemas.microsoft.com/office/drawing/2014/main" id="{7A6C92FB-BD8A-8D4A-9527-4A336758DB5B}"/>
+                <a16:creationId xmlns:a16="http://schemas.microsoft.com/office/drawing/2014/main" xmlns="" id="{7A6C92FB-BD8A-8D4A-9527-4A336758DB5B}"/>
               </a:ext>
             </a:extLst>
           </p:cNvPr>
@@ -2513,7 +2514,7 @@
           <a:p>
             <a:fld id="{EADC89E0-F5F8-6A4E-AED1-6ECC4C035956}" type="datetimeFigureOut">
               <a:rPr lang="en-US" smtClean="0"/>
-              <a:t>10/5/18</a:t>
+              <a:t>3/30/19</a:t>
             </a:fld>
             <a:endParaRPr lang="en-US"/>
           </a:p>
@@ -2524,7 +2525,7 @@
           <p:cNvPr id="3" name="Footer Placeholder 2">
             <a:extLst>
               <a:ext uri="{FF2B5EF4-FFF2-40B4-BE49-F238E27FC236}">
-                <a16:creationId xmlns="" xmlns:a16="http://schemas.microsoft.com/office/drawing/2014/main" id="{73C5BEF3-2398-AE47-8185-C7359E8E3DE1}"/>
+                <a16:creationId xmlns:a16="http://schemas.microsoft.com/office/drawing/2014/main" xmlns="" id="{73C5BEF3-2398-AE47-8185-C7359E8E3DE1}"/>
               </a:ext>
             </a:extLst>
           </p:cNvPr>
@@ -2549,7 +2550,7 @@
           <p:cNvPr id="4" name="Slide Number Placeholder 3">
             <a:extLst>
               <a:ext uri="{FF2B5EF4-FFF2-40B4-BE49-F238E27FC236}">
-                <a16:creationId xmlns="" xmlns:a16="http://schemas.microsoft.com/office/drawing/2014/main" id="{2E4DA44B-6415-B140-B648-4D138CAEEE64}"/>
+                <a16:creationId xmlns:a16="http://schemas.microsoft.com/office/drawing/2014/main" xmlns="" id="{2E4DA44B-6415-B140-B648-4D138CAEEE64}"/>
               </a:ext>
             </a:extLst>
           </p:cNvPr>
@@ -2608,7 +2609,7 @@
           <p:cNvPr id="2" name="Title 1">
             <a:extLst>
               <a:ext uri="{FF2B5EF4-FFF2-40B4-BE49-F238E27FC236}">
-                <a16:creationId xmlns="" xmlns:a16="http://schemas.microsoft.com/office/drawing/2014/main" id="{552893C4-9540-484C-BC47-84E3A83E3B59}"/>
+                <a16:creationId xmlns:a16="http://schemas.microsoft.com/office/drawing/2014/main" xmlns="" id="{552893C4-9540-484C-BC47-84E3A83E3B59}"/>
               </a:ext>
             </a:extLst>
           </p:cNvPr>
@@ -2645,7 +2646,7 @@
           <p:cNvPr id="3" name="Content Placeholder 2">
             <a:extLst>
               <a:ext uri="{FF2B5EF4-FFF2-40B4-BE49-F238E27FC236}">
-                <a16:creationId xmlns="" xmlns:a16="http://schemas.microsoft.com/office/drawing/2014/main" id="{78B7B1E8-2AAE-DF47-8DDB-67CB69243583}"/>
+                <a16:creationId xmlns:a16="http://schemas.microsoft.com/office/drawing/2014/main" xmlns="" id="{78B7B1E8-2AAE-DF47-8DDB-67CB69243583}"/>
               </a:ext>
             </a:extLst>
           </p:cNvPr>
@@ -2735,7 +2736,7 @@
           <p:cNvPr id="4" name="Text Placeholder 3">
             <a:extLst>
               <a:ext uri="{FF2B5EF4-FFF2-40B4-BE49-F238E27FC236}">
-                <a16:creationId xmlns="" xmlns:a16="http://schemas.microsoft.com/office/drawing/2014/main" id="{E19D2349-1BE5-744A-91E4-BDCB62580B9D}"/>
+                <a16:creationId xmlns:a16="http://schemas.microsoft.com/office/drawing/2014/main" xmlns="" id="{E19D2349-1BE5-744A-91E4-BDCB62580B9D}"/>
               </a:ext>
             </a:extLst>
           </p:cNvPr>
@@ -2806,7 +2807,7 @@
           <p:cNvPr id="5" name="Date Placeholder 4">
             <a:extLst>
               <a:ext uri="{FF2B5EF4-FFF2-40B4-BE49-F238E27FC236}">
-                <a16:creationId xmlns="" xmlns:a16="http://schemas.microsoft.com/office/drawing/2014/main" id="{1D8D0588-4933-8649-8EB2-315BC1C8027C}"/>
+                <a16:creationId xmlns:a16="http://schemas.microsoft.com/office/drawing/2014/main" xmlns="" id="{1D8D0588-4933-8649-8EB2-315BC1C8027C}"/>
               </a:ext>
             </a:extLst>
           </p:cNvPr>
@@ -2824,7 +2825,7 @@
           <a:p>
             <a:fld id="{EADC89E0-F5F8-6A4E-AED1-6ECC4C035956}" type="datetimeFigureOut">
               <a:rPr lang="en-US" smtClean="0"/>
-              <a:t>10/5/18</a:t>
+              <a:t>3/30/19</a:t>
             </a:fld>
             <a:endParaRPr lang="en-US"/>
           </a:p>
@@ -2835,7 +2836,7 @@
           <p:cNvPr id="6" name="Footer Placeholder 5">
             <a:extLst>
               <a:ext uri="{FF2B5EF4-FFF2-40B4-BE49-F238E27FC236}">
-                <a16:creationId xmlns="" xmlns:a16="http://schemas.microsoft.com/office/drawing/2014/main" id="{AC3DFEDA-DBDD-2C46-9212-9FE326F06A68}"/>
+                <a16:creationId xmlns:a16="http://schemas.microsoft.com/office/drawing/2014/main" xmlns="" id="{AC3DFEDA-DBDD-2C46-9212-9FE326F06A68}"/>
               </a:ext>
             </a:extLst>
           </p:cNvPr>
@@ -2860,7 +2861,7 @@
           <p:cNvPr id="7" name="Slide Number Placeholder 6">
             <a:extLst>
               <a:ext uri="{FF2B5EF4-FFF2-40B4-BE49-F238E27FC236}">
-                <a16:creationId xmlns="" xmlns:a16="http://schemas.microsoft.com/office/drawing/2014/main" id="{6CC74BB0-8C34-5F43-B04C-7BB86E5B66FF}"/>
+                <a16:creationId xmlns:a16="http://schemas.microsoft.com/office/drawing/2014/main" xmlns="" id="{6CC74BB0-8C34-5F43-B04C-7BB86E5B66FF}"/>
               </a:ext>
             </a:extLst>
           </p:cNvPr>
@@ -2919,7 +2920,7 @@
           <p:cNvPr id="2" name="Title 1">
             <a:extLst>
               <a:ext uri="{FF2B5EF4-FFF2-40B4-BE49-F238E27FC236}">
-                <a16:creationId xmlns="" xmlns:a16="http://schemas.microsoft.com/office/drawing/2014/main" id="{DF18D401-A7E0-1A4B-A8FB-9088CE3B45EC}"/>
+                <a16:creationId xmlns:a16="http://schemas.microsoft.com/office/drawing/2014/main" xmlns="" id="{DF18D401-A7E0-1A4B-A8FB-9088CE3B45EC}"/>
               </a:ext>
             </a:extLst>
           </p:cNvPr>
@@ -2956,7 +2957,7 @@
           <p:cNvPr id="3" name="Picture Placeholder 2">
             <a:extLst>
               <a:ext uri="{FF2B5EF4-FFF2-40B4-BE49-F238E27FC236}">
-                <a16:creationId xmlns="" xmlns:a16="http://schemas.microsoft.com/office/drawing/2014/main" id="{A3A79629-6085-9644-BD29-5B2676AED9C2}"/>
+                <a16:creationId xmlns:a16="http://schemas.microsoft.com/office/drawing/2014/main" xmlns="" id="{A3A79629-6085-9644-BD29-5B2676AED9C2}"/>
               </a:ext>
             </a:extLst>
           </p:cNvPr>
@@ -3023,7 +3024,7 @@
           <p:cNvPr id="4" name="Text Placeholder 3">
             <a:extLst>
               <a:ext uri="{FF2B5EF4-FFF2-40B4-BE49-F238E27FC236}">
-                <a16:creationId xmlns="" xmlns:a16="http://schemas.microsoft.com/office/drawing/2014/main" id="{E482E032-FE33-CF49-8EDB-B4719B64CF5B}"/>
+                <a16:creationId xmlns:a16="http://schemas.microsoft.com/office/drawing/2014/main" xmlns="" id="{E482E032-FE33-CF49-8EDB-B4719B64CF5B}"/>
               </a:ext>
             </a:extLst>
           </p:cNvPr>
@@ -3094,7 +3095,7 @@
           <p:cNvPr id="5" name="Date Placeholder 4">
             <a:extLst>
               <a:ext uri="{FF2B5EF4-FFF2-40B4-BE49-F238E27FC236}">
-                <a16:creationId xmlns="" xmlns:a16="http://schemas.microsoft.com/office/drawing/2014/main" id="{0C10120C-C0EF-9F4C-9D61-38C2715AE149}"/>
+                <a16:creationId xmlns:a16="http://schemas.microsoft.com/office/drawing/2014/main" xmlns="" id="{0C10120C-C0EF-9F4C-9D61-38C2715AE149}"/>
               </a:ext>
             </a:extLst>
           </p:cNvPr>
@@ -3112,7 +3113,7 @@
           <a:p>
             <a:fld id="{EADC89E0-F5F8-6A4E-AED1-6ECC4C035956}" type="datetimeFigureOut">
               <a:rPr lang="en-US" smtClean="0"/>
-              <a:t>10/5/18</a:t>
+              <a:t>3/30/19</a:t>
             </a:fld>
             <a:endParaRPr lang="en-US"/>
           </a:p>
@@ -3123,7 +3124,7 @@
           <p:cNvPr id="6" name="Footer Placeholder 5">
             <a:extLst>
               <a:ext uri="{FF2B5EF4-FFF2-40B4-BE49-F238E27FC236}">
-                <a16:creationId xmlns="" xmlns:a16="http://schemas.microsoft.com/office/drawing/2014/main" id="{2D65D859-24E1-814A-B217-E29EAA684B01}"/>
+                <a16:creationId xmlns:a16="http://schemas.microsoft.com/office/drawing/2014/main" xmlns="" id="{2D65D859-24E1-814A-B217-E29EAA684B01}"/>
               </a:ext>
             </a:extLst>
           </p:cNvPr>
@@ -3148,7 +3149,7 @@
           <p:cNvPr id="7" name="Slide Number Placeholder 6">
             <a:extLst>
               <a:ext uri="{FF2B5EF4-FFF2-40B4-BE49-F238E27FC236}">
-                <a16:creationId xmlns="" xmlns:a16="http://schemas.microsoft.com/office/drawing/2014/main" id="{1195C89D-F529-DF49-9A68-18C704D900F5}"/>
+                <a16:creationId xmlns:a16="http://schemas.microsoft.com/office/drawing/2014/main" xmlns="" id="{1195C89D-F529-DF49-9A68-18C704D900F5}"/>
               </a:ext>
             </a:extLst>
           </p:cNvPr>
@@ -3212,7 +3213,7 @@
           <p:cNvPr id="2" name="Title Placeholder 1">
             <a:extLst>
               <a:ext uri="{FF2B5EF4-FFF2-40B4-BE49-F238E27FC236}">
-                <a16:creationId xmlns="" xmlns:a16="http://schemas.microsoft.com/office/drawing/2014/main" id="{20F21E6A-EFCA-894E-A99E-53FE104B6D89}"/>
+                <a16:creationId xmlns:a16="http://schemas.microsoft.com/office/drawing/2014/main" xmlns="" id="{20F21E6A-EFCA-894E-A99E-53FE104B6D89}"/>
               </a:ext>
             </a:extLst>
           </p:cNvPr>
@@ -3250,7 +3251,7 @@
           <p:cNvPr id="3" name="Text Placeholder 2">
             <a:extLst>
               <a:ext uri="{FF2B5EF4-FFF2-40B4-BE49-F238E27FC236}">
-                <a16:creationId xmlns="" xmlns:a16="http://schemas.microsoft.com/office/drawing/2014/main" id="{415579C0-D55E-C44C-BC10-2EB24B08C41D}"/>
+                <a16:creationId xmlns:a16="http://schemas.microsoft.com/office/drawing/2014/main" xmlns="" id="{415579C0-D55E-C44C-BC10-2EB24B08C41D}"/>
               </a:ext>
             </a:extLst>
           </p:cNvPr>
@@ -3317,7 +3318,7 @@
           <p:cNvPr id="4" name="Date Placeholder 3">
             <a:extLst>
               <a:ext uri="{FF2B5EF4-FFF2-40B4-BE49-F238E27FC236}">
-                <a16:creationId xmlns="" xmlns:a16="http://schemas.microsoft.com/office/drawing/2014/main" id="{B308A5F5-2FBF-874A-99B4-99E502A9B762}"/>
+                <a16:creationId xmlns:a16="http://schemas.microsoft.com/office/drawing/2014/main" xmlns="" id="{B308A5F5-2FBF-874A-99B4-99E502A9B762}"/>
               </a:ext>
             </a:extLst>
           </p:cNvPr>
@@ -3353,7 +3354,7 @@
           <a:p>
             <a:fld id="{EADC89E0-F5F8-6A4E-AED1-6ECC4C035956}" type="datetimeFigureOut">
               <a:rPr lang="en-US" smtClean="0"/>
-              <a:t>10/5/18</a:t>
+              <a:t>3/30/19</a:t>
             </a:fld>
             <a:endParaRPr lang="en-US"/>
           </a:p>
@@ -3364,7 +3365,7 @@
           <p:cNvPr id="5" name="Footer Placeholder 4">
             <a:extLst>
               <a:ext uri="{FF2B5EF4-FFF2-40B4-BE49-F238E27FC236}">
-                <a16:creationId xmlns="" xmlns:a16="http://schemas.microsoft.com/office/drawing/2014/main" id="{CBD9A9A3-2A28-8746-9B58-DF5761727292}"/>
+                <a16:creationId xmlns:a16="http://schemas.microsoft.com/office/drawing/2014/main" xmlns="" id="{CBD9A9A3-2A28-8746-9B58-DF5761727292}"/>
               </a:ext>
             </a:extLst>
           </p:cNvPr>
@@ -3407,7 +3408,7 @@
           <p:cNvPr id="6" name="Slide Number Placeholder 5">
             <a:extLst>
               <a:ext uri="{FF2B5EF4-FFF2-40B4-BE49-F238E27FC236}">
-                <a16:creationId xmlns="" xmlns:a16="http://schemas.microsoft.com/office/drawing/2014/main" id="{8BCFDF62-4012-6648-BE01-3307AA00C082}"/>
+                <a16:creationId xmlns:a16="http://schemas.microsoft.com/office/drawing/2014/main" xmlns="" id="{8BCFDF62-4012-6648-BE01-3307AA00C082}"/>
               </a:ext>
             </a:extLst>
           </p:cNvPr>
@@ -3772,40 +3773,70 @@
       </p:grpSpPr>
       <p:pic>
         <p:nvPicPr>
-          <p:cNvPr id="15" name="Picture 14">
-            <a:extLst>
-              <a:ext uri="{FF2B5EF4-FFF2-40B4-BE49-F238E27FC236}">
-                <a16:creationId xmlns="" xmlns:a16="http://schemas.microsoft.com/office/drawing/2014/main" id="{355E5CA3-D80A-2841-B852-56E4A09607F2}"/>
-              </a:ext>
-            </a:extLst>
-          </p:cNvPr>
+          <p:cNvPr id="4" name="Picture 3"/>
           <p:cNvPicPr>
             <a:picLocks noChangeAspect="1"/>
           </p:cNvPicPr>
           <p:nvPr/>
         </p:nvPicPr>
         <p:blipFill>
-          <a:blip r:embed="rId3"/>
+          <a:blip r:embed="rId2">
+            <a:extLst>
+              <a:ext uri="{28A0092B-C50C-407E-A947-70E740481C1C}">
+                <a14:useLocalDpi xmlns:a14="http://schemas.microsoft.com/office/drawing/2010/main" val="0"/>
+              </a:ext>
+            </a:extLst>
+          </a:blip>
           <a:stretch>
             <a:fillRect/>
           </a:stretch>
         </p:blipFill>
         <p:spPr>
           <a:xfrm>
-            <a:off x="8189397" y="344340"/>
-            <a:ext cx="2883655" cy="2872347"/>
+            <a:off x="64326" y="2362463"/>
+            <a:ext cx="4594392" cy="4495537"/>
           </a:xfrm>
           <a:prstGeom prst="rect">
             <a:avLst/>
           </a:prstGeom>
         </p:spPr>
       </p:pic>
-      <p:sp>
-        <p:nvSpPr>
-          <p:cNvPr id="16" name="Oval 15">
-            <a:extLst>
-              <a:ext uri="{FF2B5EF4-FFF2-40B4-BE49-F238E27FC236}">
-                <a16:creationId xmlns="" xmlns:a16="http://schemas.microsoft.com/office/drawing/2014/main" id="{8616F469-33AB-CE43-906B-730C2FE2A5EA}"/>
+      <p:pic>
+        <p:nvPicPr>
+          <p:cNvPr id="7" name="Picture 6"/>
+          <p:cNvPicPr>
+            <a:picLocks noChangeAspect="1"/>
+          </p:cNvPicPr>
+          <p:nvPr/>
+        </p:nvPicPr>
+        <p:blipFill>
+          <a:blip r:embed="rId3">
+            <a:extLst>
+              <a:ext uri="{28A0092B-C50C-407E-A947-70E740481C1C}">
+                <a14:useLocalDpi xmlns:a14="http://schemas.microsoft.com/office/drawing/2010/main" val="0"/>
+              </a:ext>
+            </a:extLst>
+          </a:blip>
+          <a:stretch>
+            <a:fillRect/>
+          </a:stretch>
+        </p:blipFill>
+        <p:spPr>
+          <a:xfrm>
+            <a:off x="5555219" y="2398023"/>
+            <a:ext cx="4545109" cy="4459977"/>
+          </a:xfrm>
+          <a:prstGeom prst="rect">
+            <a:avLst/>
+          </a:prstGeom>
+        </p:spPr>
+      </p:pic>
+      <p:sp>
+        <p:nvSpPr>
+          <p:cNvPr id="8" name="Right Arrow 7">
+            <a:extLst>
+              <a:ext uri="{FF2B5EF4-FFF2-40B4-BE49-F238E27FC236}">
+                <a16:creationId xmlns:a16="http://schemas.microsoft.com/office/drawing/2014/main" xmlns="" id="{E31B50BC-A6BA-554E-8AA1-9C6E171DC16F}"/>
               </a:ext>
             </a:extLst>
           </p:cNvPr>
@@ -3814,18 +3845,36 @@
         </p:nvSpPr>
         <p:spPr>
           <a:xfrm>
-            <a:off x="10007739" y="1819277"/>
-            <a:ext cx="60324" cy="60324"/>
-          </a:xfrm>
-          <a:prstGeom prst="ellipse">
+            <a:off x="4601122" y="3952464"/>
+            <a:ext cx="895906" cy="228838"/>
+          </a:xfrm>
+          <a:prstGeom prst="rightArrow">
             <a:avLst/>
           </a:prstGeom>
-          <a:noFill/>
-          <a:ln w="19050">
+          <a:solidFill>
+            <a:schemeClr val="bg1">
+              <a:lumMod val="75000"/>
+            </a:schemeClr>
+          </a:solidFill>
+          <a:ln>
             <a:solidFill>
-              <a:srgbClr val="FF0000"/>
+              <a:schemeClr val="tx1"/>
             </a:solidFill>
           </a:ln>
+          <a:effectLst>
+            <a:outerShdw blurRad="50800" dist="76200" dir="2700000" algn="tl" rotWithShape="0">
+              <a:prstClr val="black">
+                <a:alpha val="40000"/>
+              </a:prstClr>
+            </a:outerShdw>
+          </a:effectLst>
+          <a:scene3d>
+            <a:camera prst="orthographicFront"/>
+            <a:lightRig rig="threePt" dir="t"/>
+          </a:scene3d>
+          <a:sp3d>
+            <a:bevelT prst="angle"/>
+          </a:sp3d>
         </p:spPr>
         <p:style>
           <a:lnRef idx="2">
@@ -3848,40 +3897,462 @@
           <a:lstStyle/>
           <a:p>
             <a:pPr algn="ctr"/>
-            <a:endParaRPr lang="en-US">
-              <a:solidFill>
-                <a:srgbClr val="FF0000"/>
-              </a:solidFill>
-            </a:endParaRPr>
-          </a:p>
-        </p:txBody>
-      </p:sp>
-      <p:sp>
-        <p:nvSpPr>
-          <p:cNvPr id="17" name="Oval 16">
-            <a:extLst>
-              <a:ext uri="{FF2B5EF4-FFF2-40B4-BE49-F238E27FC236}">
-                <a16:creationId xmlns="" xmlns:a16="http://schemas.microsoft.com/office/drawing/2014/main" id="{B1AB838A-8EFB-D64A-B409-9195562B79CC}"/>
-              </a:ext>
-            </a:extLst>
-          </p:cNvPr>
-          <p:cNvSpPr/>
+            <a:endParaRPr lang="en-US" dirty="0"/>
+          </a:p>
+        </p:txBody>
+      </p:sp>
+      <p:sp>
+        <p:nvSpPr>
+          <p:cNvPr id="9" name="TextBox 8">
+            <a:extLst>
+              <a:ext uri="{FF2B5EF4-FFF2-40B4-BE49-F238E27FC236}">
+                <a16:creationId xmlns:a16="http://schemas.microsoft.com/office/drawing/2014/main" xmlns="" id="{5FE067EA-D1CA-CF44-86B4-53E19073F857}"/>
+              </a:ext>
+            </a:extLst>
+          </p:cNvPr>
+          <p:cNvSpPr txBox="1"/>
           <p:nvPr/>
         </p:nvSpPr>
         <p:spPr>
           <a:xfrm>
-            <a:off x="9826764" y="2016127"/>
-            <a:ext cx="60324" cy="60324"/>
-          </a:xfrm>
-          <a:prstGeom prst="ellipse">
+            <a:off x="8316808" y="6319558"/>
+            <a:ext cx="1598515" cy="400110"/>
+          </a:xfrm>
+          <a:prstGeom prst="rect">
             <a:avLst/>
           </a:prstGeom>
           <a:noFill/>
-          <a:ln w="19050">
-            <a:solidFill>
-              <a:srgbClr val="FF0000"/>
-            </a:solidFill>
-          </a:ln>
+        </p:spPr>
+        <p:txBody>
+          <a:bodyPr wrap="none" rtlCol="0">
+            <a:spAutoFit/>
+          </a:bodyPr>
+          <a:lstStyle/>
+          <a:p>
+            <a:r>
+              <a:rPr lang="en-US" sz="2000" dirty="0" smtClean="0">
+                <a:latin typeface="Times" charset="0"/>
+                <a:ea typeface="Times" charset="0"/>
+                <a:cs typeface="Times" charset="0"/>
+              </a:rPr>
+              <a:t>Eruption </a:t>
+            </a:r>
+            <a:r>
+              <a:rPr lang="en-US" sz="2000" dirty="0">
+                <a:latin typeface="Times" charset="0"/>
+                <a:ea typeface="Times" charset="0"/>
+                <a:cs typeface="Times" charset="0"/>
+              </a:rPr>
+              <a:t>time</a:t>
+            </a:r>
+          </a:p>
+        </p:txBody>
+      </p:sp>
+      <p:sp>
+        <p:nvSpPr>
+          <p:cNvPr id="10" name="TextBox 9">
+            <a:extLst>
+              <a:ext uri="{FF2B5EF4-FFF2-40B4-BE49-F238E27FC236}">
+                <a16:creationId xmlns:a16="http://schemas.microsoft.com/office/drawing/2014/main" xmlns="" id="{4B85DE99-C36B-314A-A1ED-E33F1B836CBF}"/>
+              </a:ext>
+            </a:extLst>
+          </p:cNvPr>
+          <p:cNvSpPr txBox="1"/>
+          <p:nvPr/>
+        </p:nvSpPr>
+        <p:spPr>
+          <a:xfrm rot="16200000">
+            <a:off x="5225140" y="3388089"/>
+            <a:ext cx="1506118" cy="400110"/>
+          </a:xfrm>
+          <a:prstGeom prst="rect">
+            <a:avLst/>
+          </a:prstGeom>
+          <a:noFill/>
+        </p:spPr>
+        <p:txBody>
+          <a:bodyPr wrap="none" rtlCol="0">
+            <a:spAutoFit/>
+          </a:bodyPr>
+          <a:lstStyle/>
+          <a:p>
+            <a:r>
+              <a:rPr lang="en-US" sz="2000" dirty="0">
+                <a:latin typeface="Times" charset="0"/>
+                <a:ea typeface="Times" charset="0"/>
+                <a:cs typeface="Times" charset="0"/>
+              </a:rPr>
+              <a:t>Waiting time</a:t>
+            </a:r>
+          </a:p>
+        </p:txBody>
+      </p:sp>
+      <p:sp>
+        <p:nvSpPr>
+          <p:cNvPr id="11" name="TextBox 10">
+            <a:extLst>
+              <a:ext uri="{FF2B5EF4-FFF2-40B4-BE49-F238E27FC236}">
+                <a16:creationId xmlns:a16="http://schemas.microsoft.com/office/drawing/2014/main" xmlns="" id="{3C190518-5E00-584E-9EA4-D3D053F8584C}"/>
+              </a:ext>
+            </a:extLst>
+          </p:cNvPr>
+          <p:cNvSpPr txBox="1"/>
+          <p:nvPr/>
+        </p:nvSpPr>
+        <p:spPr>
+          <a:xfrm>
+            <a:off x="2772900" y="6319558"/>
+            <a:ext cx="1598515" cy="400110"/>
+          </a:xfrm>
+          <a:prstGeom prst="rect">
+            <a:avLst/>
+          </a:prstGeom>
+          <a:noFill/>
+        </p:spPr>
+        <p:txBody>
+          <a:bodyPr wrap="none" rtlCol="0">
+            <a:spAutoFit/>
+          </a:bodyPr>
+          <a:lstStyle/>
+          <a:p>
+            <a:r>
+              <a:rPr lang="en-US" sz="2000" dirty="0">
+                <a:latin typeface="Times" charset="0"/>
+                <a:ea typeface="Times" charset="0"/>
+                <a:cs typeface="Times" charset="0"/>
+              </a:rPr>
+              <a:t>Eruption time</a:t>
+            </a:r>
+          </a:p>
+        </p:txBody>
+      </p:sp>
+      <p:sp>
+        <p:nvSpPr>
+          <p:cNvPr id="12" name="TextBox 11">
+            <a:extLst>
+              <a:ext uri="{FF2B5EF4-FFF2-40B4-BE49-F238E27FC236}">
+                <a16:creationId xmlns:a16="http://schemas.microsoft.com/office/drawing/2014/main" xmlns="" id="{844623FB-E970-C54A-B92A-82106CD3A11B}"/>
+              </a:ext>
+            </a:extLst>
+          </p:cNvPr>
+          <p:cNvSpPr txBox="1"/>
+          <p:nvPr/>
+        </p:nvSpPr>
+        <p:spPr>
+          <a:xfrm rot="16200000">
+            <a:off x="-293379" y="3388089"/>
+            <a:ext cx="1506118" cy="400110"/>
+          </a:xfrm>
+          <a:prstGeom prst="rect">
+            <a:avLst/>
+          </a:prstGeom>
+          <a:noFill/>
+        </p:spPr>
+        <p:txBody>
+          <a:bodyPr wrap="none" rtlCol="0">
+            <a:spAutoFit/>
+          </a:bodyPr>
+          <a:lstStyle/>
+          <a:p>
+            <a:r>
+              <a:rPr lang="en-US" sz="2000" dirty="0">
+                <a:latin typeface="Times" charset="0"/>
+                <a:ea typeface="Times" charset="0"/>
+                <a:cs typeface="Times" charset="0"/>
+              </a:rPr>
+              <a:t>Waiting time</a:t>
+            </a:r>
+          </a:p>
+        </p:txBody>
+      </p:sp>
+      <p:pic>
+        <p:nvPicPr>
+          <p:cNvPr id="13" name="Picture 12"/>
+          <p:cNvPicPr>
+            <a:picLocks noChangeAspect="1"/>
+          </p:cNvPicPr>
+          <p:nvPr/>
+        </p:nvPicPr>
+        <p:blipFill>
+          <a:blip r:embed="rId4">
+            <a:extLst>
+              <a:ext uri="{28A0092B-C50C-407E-A947-70E740481C1C}">
+                <a14:useLocalDpi xmlns:a14="http://schemas.microsoft.com/office/drawing/2010/main" val="0"/>
+              </a:ext>
+            </a:extLst>
+          </a:blip>
+          <a:stretch>
+            <a:fillRect/>
+          </a:stretch>
+        </p:blipFill>
+        <p:spPr>
+          <a:xfrm>
+            <a:off x="130831" y="-45919"/>
+            <a:ext cx="4501034" cy="2331919"/>
+          </a:xfrm>
+          <a:prstGeom prst="rect">
+            <a:avLst/>
+          </a:prstGeom>
+        </p:spPr>
+      </p:pic>
+      <p:pic>
+        <p:nvPicPr>
+          <p:cNvPr id="14" name="Picture 13"/>
+          <p:cNvPicPr>
+            <a:picLocks noChangeAspect="1"/>
+          </p:cNvPicPr>
+          <p:nvPr/>
+        </p:nvPicPr>
+        <p:blipFill>
+          <a:blip r:embed="rId5">
+            <a:extLst>
+              <a:ext uri="{28A0092B-C50C-407E-A947-70E740481C1C}">
+                <a14:useLocalDpi xmlns:a14="http://schemas.microsoft.com/office/drawing/2010/main" val="0"/>
+              </a:ext>
+            </a:extLst>
+          </a:blip>
+          <a:stretch>
+            <a:fillRect/>
+          </a:stretch>
+        </p:blipFill>
+        <p:spPr>
+          <a:xfrm>
+            <a:off x="5426586" y="83128"/>
+            <a:ext cx="4739044" cy="2176564"/>
+          </a:xfrm>
+          <a:prstGeom prst="rect">
+            <a:avLst/>
+          </a:prstGeom>
+        </p:spPr>
+      </p:pic>
+      <p:sp>
+        <p:nvSpPr>
+          <p:cNvPr id="15" name="TextBox 14">
+            <a:extLst>
+              <a:ext uri="{FF2B5EF4-FFF2-40B4-BE49-F238E27FC236}">
+                <a16:creationId xmlns:a16="http://schemas.microsoft.com/office/drawing/2014/main" xmlns="" id="{3C190518-5E00-584E-9EA4-D3D053F8584C}"/>
+              </a:ext>
+            </a:extLst>
+          </p:cNvPr>
+          <p:cNvSpPr txBox="1"/>
+          <p:nvPr/>
+        </p:nvSpPr>
+        <p:spPr>
+          <a:xfrm>
+            <a:off x="5978199" y="83128"/>
+            <a:ext cx="2904962" cy="400110"/>
+          </a:xfrm>
+          <a:prstGeom prst="rect">
+            <a:avLst/>
+          </a:prstGeom>
+          <a:noFill/>
+        </p:spPr>
+        <p:txBody>
+          <a:bodyPr wrap="none" rtlCol="0">
+            <a:spAutoFit/>
+          </a:bodyPr>
+          <a:lstStyle/>
+          <a:p>
+            <a:r>
+              <a:rPr lang="en-US" sz="2000">
+                <a:latin typeface="Times" charset="0"/>
+                <a:ea typeface="Times" charset="0"/>
+                <a:cs typeface="Times" charset="0"/>
+              </a:rPr>
+              <a:t>Eruption </a:t>
+            </a:r>
+            <a:r>
+              <a:rPr lang="en-US" sz="2000" smtClean="0">
+                <a:latin typeface="Times" charset="0"/>
+                <a:ea typeface="Times" charset="0"/>
+                <a:cs typeface="Times" charset="0"/>
+              </a:rPr>
+              <a:t>time (in minutes)</a:t>
+            </a:r>
+            <a:endParaRPr lang="en-US" sz="2000" dirty="0">
+              <a:latin typeface="Times" charset="0"/>
+              <a:ea typeface="Times" charset="0"/>
+              <a:cs typeface="Times" charset="0"/>
+            </a:endParaRPr>
+          </a:p>
+        </p:txBody>
+      </p:sp>
+      <p:sp>
+        <p:nvSpPr>
+          <p:cNvPr id="18" name="TextBox 17">
+            <a:extLst>
+              <a:ext uri="{FF2B5EF4-FFF2-40B4-BE49-F238E27FC236}">
+                <a16:creationId xmlns:a16="http://schemas.microsoft.com/office/drawing/2014/main" xmlns="" id="{3C190518-5E00-584E-9EA4-D3D053F8584C}"/>
+              </a:ext>
+            </a:extLst>
+          </p:cNvPr>
+          <p:cNvSpPr txBox="1"/>
+          <p:nvPr/>
+        </p:nvSpPr>
+        <p:spPr>
+          <a:xfrm>
+            <a:off x="130831" y="83128"/>
+            <a:ext cx="2812565" cy="400110"/>
+          </a:xfrm>
+          <a:prstGeom prst="rect">
+            <a:avLst/>
+          </a:prstGeom>
+          <a:noFill/>
+        </p:spPr>
+        <p:txBody>
+          <a:bodyPr wrap="none" rtlCol="0">
+            <a:spAutoFit/>
+          </a:bodyPr>
+          <a:lstStyle/>
+          <a:p>
+            <a:r>
+              <a:rPr lang="en-US" sz="2000" smtClean="0">
+                <a:latin typeface="Times" charset="0"/>
+                <a:ea typeface="Times" charset="0"/>
+                <a:cs typeface="Times" charset="0"/>
+              </a:rPr>
+              <a:t>Waiting time </a:t>
+            </a:r>
+            <a:r>
+              <a:rPr lang="en-US" sz="2000" dirty="0" smtClean="0">
+                <a:latin typeface="Times" charset="0"/>
+                <a:ea typeface="Times" charset="0"/>
+                <a:cs typeface="Times" charset="0"/>
+              </a:rPr>
+              <a:t>(in minutes)</a:t>
+            </a:r>
+            <a:endParaRPr lang="en-US" sz="2000" dirty="0">
+              <a:latin typeface="Times" charset="0"/>
+              <a:ea typeface="Times" charset="0"/>
+              <a:cs typeface="Times" charset="0"/>
+            </a:endParaRPr>
+          </a:p>
+        </p:txBody>
+      </p:sp>
+    </p:spTree>
+    <p:extLst>
+      <p:ext uri="{BB962C8B-B14F-4D97-AF65-F5344CB8AC3E}">
+        <p14:creationId xmlns:p14="http://schemas.microsoft.com/office/powerpoint/2010/main" val="1204629066"/>
+      </p:ext>
+    </p:extLst>
+  </p:cSld>
+  <p:clrMapOvr>
+    <a:masterClrMapping/>
+  </p:clrMapOvr>
+  <p:timing>
+    <p:tnLst>
+      <p:par>
+        <p:cTn id="1" dur="indefinite" restart="never" nodeType="tmRoot"/>
+      </p:par>
+    </p:tnLst>
+  </p:timing>
+</p:sld>
+</file>
+
+<file path=ppt/slides/slide2.xml><?xml version="1.0" encoding="utf-8"?>
+<p:sld xmlns:a="http://schemas.openxmlformats.org/drawingml/2006/main" xmlns:r="http://schemas.openxmlformats.org/officeDocument/2006/relationships" xmlns:p="http://schemas.openxmlformats.org/presentationml/2006/main">
+  <p:cSld>
+    <p:spTree>
+      <p:nvGrpSpPr>
+        <p:cNvPr id="1" name=""/>
+        <p:cNvGrpSpPr/>
+        <p:nvPr/>
+      </p:nvGrpSpPr>
+      <p:grpSpPr>
+        <a:xfrm>
+          <a:off x="0" y="0"/>
+          <a:ext cx="0" cy="0"/>
+          <a:chOff x="0" y="0"/>
+          <a:chExt cx="0" cy="0"/>
+        </a:xfrm>
+      </p:grpSpPr>
+      <p:pic>
+        <p:nvPicPr>
+          <p:cNvPr id="5" name="Picture 4">
+            <a:extLst>
+              <a:ext uri="{FF2B5EF4-FFF2-40B4-BE49-F238E27FC236}">
+                <a16:creationId xmlns:a16="http://schemas.microsoft.com/office/drawing/2014/main" xmlns="" id="{DA91ECD9-D840-1343-BEE5-F49A16B1CA91}"/>
+              </a:ext>
+            </a:extLst>
+          </p:cNvPr>
+          <p:cNvPicPr>
+            <a:picLocks noChangeAspect="1"/>
+          </p:cNvPicPr>
+          <p:nvPr/>
+        </p:nvPicPr>
+        <p:blipFill>
+          <a:blip r:embed="rId2"/>
+          <a:stretch>
+            <a:fillRect/>
+          </a:stretch>
+        </p:blipFill>
+        <p:spPr>
+          <a:xfrm>
+            <a:off x="358140" y="1104900"/>
+            <a:ext cx="4846320" cy="4846320"/>
+          </a:xfrm>
+          <a:prstGeom prst="rect">
+            <a:avLst/>
+          </a:prstGeom>
+        </p:spPr>
+      </p:pic>
+      <p:pic>
+        <p:nvPicPr>
+          <p:cNvPr id="6" name="Picture 5">
+            <a:extLst>
+              <a:ext uri="{FF2B5EF4-FFF2-40B4-BE49-F238E27FC236}">
+                <a16:creationId xmlns:a16="http://schemas.microsoft.com/office/drawing/2014/main" xmlns="" id="{9C919A4F-55D9-1943-B981-DDD7376174FE}"/>
+              </a:ext>
+            </a:extLst>
+          </p:cNvPr>
+          <p:cNvPicPr>
+            <a:picLocks noChangeAspect="1"/>
+          </p:cNvPicPr>
+          <p:nvPr/>
+        </p:nvPicPr>
+        <p:blipFill>
+          <a:blip r:embed="rId3"/>
+          <a:stretch>
+            <a:fillRect/>
+          </a:stretch>
+        </p:blipFill>
+        <p:spPr>
+          <a:xfrm>
+            <a:off x="7063740" y="1104900"/>
+            <a:ext cx="4846320" cy="4846320"/>
+          </a:xfrm>
+          <a:prstGeom prst="rect">
+            <a:avLst/>
+          </a:prstGeom>
+        </p:spPr>
+      </p:pic>
+      <p:sp>
+        <p:nvSpPr>
+          <p:cNvPr id="8" name="Right Arrow 7">
+            <a:extLst>
+              <a:ext uri="{FF2B5EF4-FFF2-40B4-BE49-F238E27FC236}">
+                <a16:creationId xmlns:a16="http://schemas.microsoft.com/office/drawing/2014/main" xmlns="" id="{E31B50BC-A6BA-554E-8AA1-9C6E171DC16F}"/>
+              </a:ext>
+            </a:extLst>
+          </p:cNvPr>
+          <p:cNvSpPr/>
+          <p:nvPr/>
+        </p:nvSpPr>
+        <p:spPr>
+          <a:xfrm>
+            <a:off x="5375910" y="2933700"/>
+            <a:ext cx="1516380" cy="297180"/>
+          </a:xfrm>
+          <a:prstGeom prst="rightArrow">
+            <a:avLst/>
+          </a:prstGeom>
+          <a:scene3d>
+            <a:camera prst="orthographicFront"/>
+            <a:lightRig rig="threePt" dir="t"/>
+          </a:scene3d>
+          <a:sp3d>
+            <a:bevelT prst="angle"/>
+          </a:sp3d>
         </p:spPr>
         <p:style>
           <a:lnRef idx="2">
@@ -3904,29 +4375,779 @@
           <a:lstStyle/>
           <a:p>
             <a:pPr algn="ctr"/>
-            <a:endParaRPr lang="en-US">
-              <a:solidFill>
-                <a:srgbClr val="FF0000"/>
-              </a:solidFill>
-            </a:endParaRPr>
-          </a:p>
-        </p:txBody>
-      </p:sp>
-      <p:sp>
-        <p:nvSpPr>
-          <p:cNvPr id="18" name="Oval 17">
-            <a:extLst>
-              <a:ext uri="{FF2B5EF4-FFF2-40B4-BE49-F238E27FC236}">
-                <a16:creationId xmlns="" xmlns:a16="http://schemas.microsoft.com/office/drawing/2014/main" id="{969F11EE-EAAE-5348-82FA-B4BD9494C144}"/>
-              </a:ext>
-            </a:extLst>
-          </p:cNvPr>
+            <a:endParaRPr lang="en-US" dirty="0"/>
+          </a:p>
+        </p:txBody>
+      </p:sp>
+      <p:sp>
+        <p:nvSpPr>
+          <p:cNvPr id="9" name="TextBox 8">
+            <a:extLst>
+              <a:ext uri="{FF2B5EF4-FFF2-40B4-BE49-F238E27FC236}">
+                <a16:creationId xmlns:a16="http://schemas.microsoft.com/office/drawing/2014/main" xmlns="" id="{5FE067EA-D1CA-CF44-86B4-53E19073F857}"/>
+              </a:ext>
+            </a:extLst>
+          </p:cNvPr>
+          <p:cNvSpPr txBox="1"/>
+          <p:nvPr/>
+        </p:nvSpPr>
+        <p:spPr>
+          <a:xfrm>
+            <a:off x="8749070" y="5581888"/>
+            <a:ext cx="1475660" cy="369332"/>
+          </a:xfrm>
+          <a:prstGeom prst="rect">
+            <a:avLst/>
+          </a:prstGeom>
+          <a:noFill/>
+        </p:spPr>
+        <p:txBody>
+          <a:bodyPr wrap="none" rtlCol="0">
+            <a:spAutoFit/>
+          </a:bodyPr>
+          <a:lstStyle/>
+          <a:p>
+            <a:r>
+              <a:rPr lang="en-US" dirty="0"/>
+              <a:t>Eruption time</a:t>
+            </a:r>
+          </a:p>
+        </p:txBody>
+      </p:sp>
+      <p:sp>
+        <p:nvSpPr>
+          <p:cNvPr id="10" name="TextBox 9">
+            <a:extLst>
+              <a:ext uri="{FF2B5EF4-FFF2-40B4-BE49-F238E27FC236}">
+                <a16:creationId xmlns:a16="http://schemas.microsoft.com/office/drawing/2014/main" xmlns="" id="{4B85DE99-C36B-314A-A1ED-E33F1B836CBF}"/>
+              </a:ext>
+            </a:extLst>
+          </p:cNvPr>
+          <p:cNvSpPr txBox="1"/>
+          <p:nvPr/>
+        </p:nvSpPr>
+        <p:spPr>
+          <a:xfrm rot="16200000">
+            <a:off x="6554145" y="2897624"/>
+            <a:ext cx="1388522" cy="369332"/>
+          </a:xfrm>
+          <a:prstGeom prst="rect">
+            <a:avLst/>
+          </a:prstGeom>
+          <a:noFill/>
+        </p:spPr>
+        <p:txBody>
+          <a:bodyPr wrap="none" rtlCol="0">
+            <a:spAutoFit/>
+          </a:bodyPr>
+          <a:lstStyle/>
+          <a:p>
+            <a:r>
+              <a:rPr lang="en-US" dirty="0"/>
+              <a:t>Waiting time</a:t>
+            </a:r>
+          </a:p>
+        </p:txBody>
+      </p:sp>
+      <p:sp>
+        <p:nvSpPr>
+          <p:cNvPr id="11" name="TextBox 10">
+            <a:extLst>
+              <a:ext uri="{FF2B5EF4-FFF2-40B4-BE49-F238E27FC236}">
+                <a16:creationId xmlns:a16="http://schemas.microsoft.com/office/drawing/2014/main" xmlns="" id="{3C190518-5E00-584E-9EA4-D3D053F8584C}"/>
+              </a:ext>
+            </a:extLst>
+          </p:cNvPr>
+          <p:cNvSpPr txBox="1"/>
+          <p:nvPr/>
+        </p:nvSpPr>
+        <p:spPr>
+          <a:xfrm>
+            <a:off x="2129195" y="5581888"/>
+            <a:ext cx="1475660" cy="369332"/>
+          </a:xfrm>
+          <a:prstGeom prst="rect">
+            <a:avLst/>
+          </a:prstGeom>
+          <a:noFill/>
+        </p:spPr>
+        <p:txBody>
+          <a:bodyPr wrap="none" rtlCol="0">
+            <a:spAutoFit/>
+          </a:bodyPr>
+          <a:lstStyle/>
+          <a:p>
+            <a:r>
+              <a:rPr lang="en-US" dirty="0"/>
+              <a:t>Eruption time</a:t>
+            </a:r>
+          </a:p>
+        </p:txBody>
+      </p:sp>
+      <p:sp>
+        <p:nvSpPr>
+          <p:cNvPr id="12" name="TextBox 11">
+            <a:extLst>
+              <a:ext uri="{FF2B5EF4-FFF2-40B4-BE49-F238E27FC236}">
+                <a16:creationId xmlns:a16="http://schemas.microsoft.com/office/drawing/2014/main" xmlns="" id="{844623FB-E970-C54A-B92A-82106CD3A11B}"/>
+              </a:ext>
+            </a:extLst>
+          </p:cNvPr>
+          <p:cNvSpPr txBox="1"/>
+          <p:nvPr/>
+        </p:nvSpPr>
+        <p:spPr>
+          <a:xfrm rot="16200000">
+            <a:off x="-151455" y="2755690"/>
+            <a:ext cx="1388522" cy="369332"/>
+          </a:xfrm>
+          <a:prstGeom prst="rect">
+            <a:avLst/>
+          </a:prstGeom>
+          <a:noFill/>
+        </p:spPr>
+        <p:txBody>
+          <a:bodyPr wrap="none" rtlCol="0">
+            <a:spAutoFit/>
+          </a:bodyPr>
+          <a:lstStyle/>
+          <a:p>
+            <a:r>
+              <a:rPr lang="en-US" dirty="0"/>
+              <a:t>Waiting time</a:t>
+            </a:r>
+          </a:p>
+        </p:txBody>
+      </p:sp>
+    </p:spTree>
+    <p:extLst>
+      <p:ext uri="{BB962C8B-B14F-4D97-AF65-F5344CB8AC3E}">
+        <p14:creationId xmlns:p14="http://schemas.microsoft.com/office/powerpoint/2010/main" val="1079744557"/>
+      </p:ext>
+    </p:extLst>
+  </p:cSld>
+  <p:clrMapOvr>
+    <a:masterClrMapping/>
+  </p:clrMapOvr>
+  <p:timing>
+    <p:tnLst>
+      <p:par>
+        <p:cTn id="1" dur="indefinite" restart="never" nodeType="tmRoot"/>
+      </p:par>
+    </p:tnLst>
+  </p:timing>
+</p:sld>
+</file>
+
+<file path=ppt/slides/slide3.xml><?xml version="1.0" encoding="utf-8"?>
+<p:sld xmlns:a="http://schemas.openxmlformats.org/drawingml/2006/main" xmlns:r="http://schemas.openxmlformats.org/officeDocument/2006/relationships" xmlns:p="http://schemas.openxmlformats.org/presentationml/2006/main">
+  <p:cSld>
+    <p:spTree>
+      <p:nvGrpSpPr>
+        <p:cNvPr id="1" name=""/>
+        <p:cNvGrpSpPr/>
+        <p:nvPr/>
+      </p:nvGrpSpPr>
+      <p:grpSpPr>
+        <a:xfrm>
+          <a:off x="0" y="0"/>
+          <a:ext cx="0" cy="0"/>
+          <a:chOff x="0" y="0"/>
+          <a:chExt cx="0" cy="0"/>
+        </a:xfrm>
+      </p:grpSpPr>
+      <p:pic>
+        <p:nvPicPr>
+          <p:cNvPr id="5" name="Picture 4">
+            <a:extLst>
+              <a:ext uri="{FF2B5EF4-FFF2-40B4-BE49-F238E27FC236}">
+                <a16:creationId xmlns:a16="http://schemas.microsoft.com/office/drawing/2014/main" xmlns="" id="{DA91ECD9-D840-1343-BEE5-F49A16B1CA91}"/>
+              </a:ext>
+            </a:extLst>
+          </p:cNvPr>
+          <p:cNvPicPr>
+            <a:picLocks noChangeAspect="1"/>
+          </p:cNvPicPr>
+          <p:nvPr/>
+        </p:nvPicPr>
+        <p:blipFill>
+          <a:blip r:embed="rId2"/>
+          <a:stretch>
+            <a:fillRect/>
+          </a:stretch>
+        </p:blipFill>
+        <p:spPr>
+          <a:xfrm>
+            <a:off x="58882" y="494025"/>
+            <a:ext cx="3748347" cy="3748347"/>
+          </a:xfrm>
+          <a:prstGeom prst="rect">
+            <a:avLst/>
+          </a:prstGeom>
+        </p:spPr>
+      </p:pic>
+      <p:pic>
+        <p:nvPicPr>
+          <p:cNvPr id="2" name="Picture 1">
+            <a:extLst>
+              <a:ext uri="{FF2B5EF4-FFF2-40B4-BE49-F238E27FC236}">
+                <a16:creationId xmlns:a16="http://schemas.microsoft.com/office/drawing/2014/main" xmlns="" id="{CFB03B4F-763D-3F40-BBEF-EF908B158904}"/>
+              </a:ext>
+            </a:extLst>
+          </p:cNvPr>
+          <p:cNvPicPr>
+            <a:picLocks noChangeAspect="1"/>
+          </p:cNvPicPr>
+          <p:nvPr/>
+        </p:nvPicPr>
+        <p:blipFill>
+          <a:blip r:embed="rId3"/>
+          <a:stretch>
+            <a:fillRect/>
+          </a:stretch>
+        </p:blipFill>
+        <p:spPr>
+          <a:xfrm>
+            <a:off x="4081550" y="494025"/>
+            <a:ext cx="3770526" cy="3748347"/>
+          </a:xfrm>
+          <a:prstGeom prst="rect">
+            <a:avLst/>
+          </a:prstGeom>
+        </p:spPr>
+      </p:pic>
+      <p:sp>
+        <p:nvSpPr>
+          <p:cNvPr id="7" name="TextBox 6">
+            <a:extLst>
+              <a:ext uri="{FF2B5EF4-FFF2-40B4-BE49-F238E27FC236}">
+                <a16:creationId xmlns:a16="http://schemas.microsoft.com/office/drawing/2014/main" xmlns="" id="{D6522514-518E-D94A-AF9A-6B4D99F5691D}"/>
+              </a:ext>
+            </a:extLst>
+          </p:cNvPr>
+          <p:cNvSpPr txBox="1"/>
+          <p:nvPr/>
+        </p:nvSpPr>
+        <p:spPr>
+          <a:xfrm rot="16200000">
+            <a:off x="3624982" y="1308038"/>
+            <a:ext cx="1251689" cy="338554"/>
+          </a:xfrm>
+          <a:prstGeom prst="rect">
+            <a:avLst/>
+          </a:prstGeom>
+          <a:noFill/>
+        </p:spPr>
+        <p:txBody>
+          <a:bodyPr wrap="none" rtlCol="0">
+            <a:spAutoFit/>
+          </a:bodyPr>
+          <a:lstStyle/>
+          <a:p>
+            <a:r>
+              <a:rPr lang="en-US" sz="1600" dirty="0"/>
+              <a:t>Waiting time</a:t>
+            </a:r>
+          </a:p>
+        </p:txBody>
+      </p:sp>
+      <p:sp>
+        <p:nvSpPr>
+          <p:cNvPr id="9" name="TextBox 8">
+            <a:extLst>
+              <a:ext uri="{FF2B5EF4-FFF2-40B4-BE49-F238E27FC236}">
+                <a16:creationId xmlns:a16="http://schemas.microsoft.com/office/drawing/2014/main" xmlns="" id="{BBD486EA-EF24-F14F-B6E9-1D13AFFBE9CD}"/>
+              </a:ext>
+            </a:extLst>
+          </p:cNvPr>
+          <p:cNvSpPr txBox="1"/>
+          <p:nvPr/>
+        </p:nvSpPr>
+        <p:spPr>
+          <a:xfrm>
+            <a:off x="1988037" y="3843053"/>
+            <a:ext cx="1660647" cy="338554"/>
+          </a:xfrm>
+          <a:prstGeom prst="rect">
+            <a:avLst/>
+          </a:prstGeom>
+          <a:noFill/>
+        </p:spPr>
+        <p:txBody>
+          <a:bodyPr wrap="none" rtlCol="0">
+            <a:spAutoFit/>
+          </a:bodyPr>
+          <a:lstStyle/>
+          <a:p>
+            <a:r>
+              <a:rPr lang="en-US" sz="1600" dirty="0"/>
+              <a:t>Eruption </a:t>
+            </a:r>
+            <a:r>
+              <a:rPr lang="en-US" sz="1600" dirty="0" smtClean="0"/>
+              <a:t>duration</a:t>
+            </a:r>
+            <a:endParaRPr lang="en-US" sz="1600" dirty="0"/>
+          </a:p>
+        </p:txBody>
+      </p:sp>
+      <p:sp>
+        <p:nvSpPr>
+          <p:cNvPr id="10" name="TextBox 9">
+            <a:extLst>
+              <a:ext uri="{FF2B5EF4-FFF2-40B4-BE49-F238E27FC236}">
+                <a16:creationId xmlns:a16="http://schemas.microsoft.com/office/drawing/2014/main" xmlns="" id="{D9A5DDC0-EF07-4D48-89DC-8FC5A5F32B1E}"/>
+              </a:ext>
+            </a:extLst>
+          </p:cNvPr>
+          <p:cNvSpPr txBox="1"/>
+          <p:nvPr/>
+        </p:nvSpPr>
+        <p:spPr>
+          <a:xfrm rot="16200000">
+            <a:off x="-382296" y="1308039"/>
+            <a:ext cx="1251689" cy="338554"/>
+          </a:xfrm>
+          <a:prstGeom prst="rect">
+            <a:avLst/>
+          </a:prstGeom>
+          <a:noFill/>
+        </p:spPr>
+        <p:txBody>
+          <a:bodyPr wrap="none" rtlCol="0">
+            <a:spAutoFit/>
+          </a:bodyPr>
+          <a:lstStyle/>
+          <a:p>
+            <a:r>
+              <a:rPr lang="en-US" sz="1600" dirty="0"/>
+              <a:t>Waiting time</a:t>
+            </a:r>
+          </a:p>
+        </p:txBody>
+      </p:sp>
+      <p:pic>
+        <p:nvPicPr>
+          <p:cNvPr id="11" name="Picture 10">
+            <a:extLst>
+              <a:ext uri="{FF2B5EF4-FFF2-40B4-BE49-F238E27FC236}">
+                <a16:creationId xmlns:a16="http://schemas.microsoft.com/office/drawing/2014/main" xmlns="" id="{9C919A4F-55D9-1943-B981-DDD7376174FE}"/>
+              </a:ext>
+            </a:extLst>
+          </p:cNvPr>
+          <p:cNvPicPr>
+            <a:picLocks noChangeAspect="1"/>
+          </p:cNvPicPr>
+          <p:nvPr/>
+        </p:nvPicPr>
+        <p:blipFill>
+          <a:blip r:embed="rId4"/>
+          <a:stretch>
+            <a:fillRect/>
+          </a:stretch>
+        </p:blipFill>
+        <p:spPr>
+          <a:xfrm>
+            <a:off x="8126396" y="488542"/>
+            <a:ext cx="3753829" cy="3753829"/>
+          </a:xfrm>
+          <a:prstGeom prst="rect">
+            <a:avLst/>
+          </a:prstGeom>
+        </p:spPr>
+      </p:pic>
+      <p:sp>
+        <p:nvSpPr>
+          <p:cNvPr id="13" name="TextBox 12">
+            <a:extLst>
+              <a:ext uri="{FF2B5EF4-FFF2-40B4-BE49-F238E27FC236}">
+                <a16:creationId xmlns:a16="http://schemas.microsoft.com/office/drawing/2014/main" xmlns="" id="{D6522514-518E-D94A-AF9A-6B4D99F5691D}"/>
+              </a:ext>
+            </a:extLst>
+          </p:cNvPr>
+          <p:cNvSpPr txBox="1"/>
+          <p:nvPr/>
+        </p:nvSpPr>
+        <p:spPr>
+          <a:xfrm rot="16200000">
+            <a:off x="7669829" y="1308038"/>
+            <a:ext cx="1251689" cy="338554"/>
+          </a:xfrm>
+          <a:prstGeom prst="rect">
+            <a:avLst/>
+          </a:prstGeom>
+          <a:noFill/>
+        </p:spPr>
+        <p:txBody>
+          <a:bodyPr wrap="none" rtlCol="0">
+            <a:spAutoFit/>
+          </a:bodyPr>
+          <a:lstStyle/>
+          <a:p>
+            <a:r>
+              <a:rPr lang="en-US" sz="1600" dirty="0"/>
+              <a:t>Waiting time</a:t>
+            </a:r>
+          </a:p>
+        </p:txBody>
+      </p:sp>
+      <p:sp>
+        <p:nvSpPr>
+          <p:cNvPr id="14" name="TextBox 13">
+            <a:extLst>
+              <a:ext uri="{FF2B5EF4-FFF2-40B4-BE49-F238E27FC236}">
+                <a16:creationId xmlns:a16="http://schemas.microsoft.com/office/drawing/2014/main" xmlns="" id="{BBD486EA-EF24-F14F-B6E9-1D13AFFBE9CD}"/>
+              </a:ext>
+            </a:extLst>
+          </p:cNvPr>
+          <p:cNvSpPr txBox="1"/>
+          <p:nvPr/>
+        </p:nvSpPr>
+        <p:spPr>
+          <a:xfrm>
+            <a:off x="5966813" y="3843053"/>
+            <a:ext cx="1660647" cy="338554"/>
+          </a:xfrm>
+          <a:prstGeom prst="rect">
+            <a:avLst/>
+          </a:prstGeom>
+          <a:noFill/>
+        </p:spPr>
+        <p:txBody>
+          <a:bodyPr wrap="none" rtlCol="0">
+            <a:spAutoFit/>
+          </a:bodyPr>
+          <a:lstStyle/>
+          <a:p>
+            <a:r>
+              <a:rPr lang="en-US" sz="1600" dirty="0"/>
+              <a:t>Eruption </a:t>
+            </a:r>
+            <a:r>
+              <a:rPr lang="en-US" sz="1600" dirty="0" smtClean="0"/>
+              <a:t>duration</a:t>
+            </a:r>
+            <a:endParaRPr lang="en-US" sz="1600" dirty="0"/>
+          </a:p>
+        </p:txBody>
+      </p:sp>
+      <p:sp>
+        <p:nvSpPr>
+          <p:cNvPr id="15" name="TextBox 14">
+            <a:extLst>
+              <a:ext uri="{FF2B5EF4-FFF2-40B4-BE49-F238E27FC236}">
+                <a16:creationId xmlns:a16="http://schemas.microsoft.com/office/drawing/2014/main" xmlns="" id="{BBD486EA-EF24-F14F-B6E9-1D13AFFBE9CD}"/>
+              </a:ext>
+            </a:extLst>
+          </p:cNvPr>
+          <p:cNvSpPr txBox="1"/>
+          <p:nvPr/>
+        </p:nvSpPr>
+        <p:spPr>
+          <a:xfrm>
+            <a:off x="10153906" y="3843053"/>
+            <a:ext cx="1660647" cy="338554"/>
+          </a:xfrm>
+          <a:prstGeom prst="rect">
+            <a:avLst/>
+          </a:prstGeom>
+          <a:noFill/>
+        </p:spPr>
+        <p:txBody>
+          <a:bodyPr wrap="none" rtlCol="0">
+            <a:spAutoFit/>
+          </a:bodyPr>
+          <a:lstStyle/>
+          <a:p>
+            <a:r>
+              <a:rPr lang="en-US" sz="1600" dirty="0"/>
+              <a:t>Eruption </a:t>
+            </a:r>
+            <a:r>
+              <a:rPr lang="en-US" sz="1600" dirty="0" smtClean="0"/>
+              <a:t>duration</a:t>
+            </a:r>
+            <a:endParaRPr lang="en-US" sz="1600" dirty="0"/>
+          </a:p>
+        </p:txBody>
+      </p:sp>
+      <p:sp>
+        <p:nvSpPr>
+          <p:cNvPr id="16" name="TextBox 15">
+            <a:extLst>
+              <a:ext uri="{FF2B5EF4-FFF2-40B4-BE49-F238E27FC236}">
+                <a16:creationId xmlns:a16="http://schemas.microsoft.com/office/drawing/2014/main" xmlns="" id="{0798B99F-FCE0-7747-9AD4-297C36E91E7F}"/>
+              </a:ext>
+            </a:extLst>
+          </p:cNvPr>
+          <p:cNvSpPr txBox="1"/>
+          <p:nvPr/>
+        </p:nvSpPr>
+        <p:spPr>
+          <a:xfrm>
+            <a:off x="1778169" y="4134304"/>
+            <a:ext cx="574196" cy="523220"/>
+          </a:xfrm>
+          <a:prstGeom prst="rect">
+            <a:avLst/>
+          </a:prstGeom>
+          <a:noFill/>
+        </p:spPr>
+        <p:txBody>
+          <a:bodyPr wrap="none" rtlCol="0">
+            <a:spAutoFit/>
+          </a:bodyPr>
+          <a:lstStyle/>
+          <a:p>
+            <a:r>
+              <a:rPr lang="en-US" sz="2800" dirty="0" smtClean="0"/>
+              <a:t>(a)</a:t>
+            </a:r>
+            <a:endParaRPr lang="en-US" sz="2800" dirty="0"/>
+          </a:p>
+        </p:txBody>
+      </p:sp>
+      <p:sp>
+        <p:nvSpPr>
+          <p:cNvPr id="17" name="TextBox 16">
+            <a:extLst>
+              <a:ext uri="{FF2B5EF4-FFF2-40B4-BE49-F238E27FC236}">
+                <a16:creationId xmlns:a16="http://schemas.microsoft.com/office/drawing/2014/main" xmlns="" id="{0798B99F-FCE0-7747-9AD4-297C36E91E7F}"/>
+              </a:ext>
+            </a:extLst>
+          </p:cNvPr>
+          <p:cNvSpPr txBox="1"/>
+          <p:nvPr/>
+        </p:nvSpPr>
+        <p:spPr>
+          <a:xfrm>
+            <a:off x="5670898" y="4151201"/>
+            <a:ext cx="591829" cy="523220"/>
+          </a:xfrm>
+          <a:prstGeom prst="rect">
+            <a:avLst/>
+          </a:prstGeom>
+          <a:noFill/>
+        </p:spPr>
+        <p:txBody>
+          <a:bodyPr wrap="none" rtlCol="0">
+            <a:spAutoFit/>
+          </a:bodyPr>
+          <a:lstStyle/>
+          <a:p>
+            <a:r>
+              <a:rPr lang="en-US" sz="2800" dirty="0" smtClean="0"/>
+              <a:t>(b)</a:t>
+            </a:r>
+            <a:endParaRPr lang="en-US" sz="2800" dirty="0"/>
+          </a:p>
+        </p:txBody>
+      </p:sp>
+      <p:sp>
+        <p:nvSpPr>
+          <p:cNvPr id="18" name="TextBox 17">
+            <a:extLst>
+              <a:ext uri="{FF2B5EF4-FFF2-40B4-BE49-F238E27FC236}">
+                <a16:creationId xmlns:a16="http://schemas.microsoft.com/office/drawing/2014/main" xmlns="" id="{0798B99F-FCE0-7747-9AD4-297C36E91E7F}"/>
+              </a:ext>
+            </a:extLst>
+          </p:cNvPr>
+          <p:cNvSpPr txBox="1"/>
+          <p:nvPr/>
+        </p:nvSpPr>
+        <p:spPr>
+          <a:xfrm>
+            <a:off x="9810754" y="4151201"/>
+            <a:ext cx="554960" cy="523220"/>
+          </a:xfrm>
+          <a:prstGeom prst="rect">
+            <a:avLst/>
+          </a:prstGeom>
+          <a:noFill/>
+        </p:spPr>
+        <p:txBody>
+          <a:bodyPr wrap="none" rtlCol="0">
+            <a:spAutoFit/>
+          </a:bodyPr>
+          <a:lstStyle/>
+          <a:p>
+            <a:r>
+              <a:rPr lang="en-US" sz="2800" dirty="0" smtClean="0"/>
+              <a:t>(c)</a:t>
+            </a:r>
+            <a:endParaRPr lang="en-US" sz="2800" dirty="0"/>
+          </a:p>
+        </p:txBody>
+      </p:sp>
+      <p:sp>
+        <p:nvSpPr>
+          <p:cNvPr id="19" name="Rectangle 18"/>
           <p:cNvSpPr/>
           <p:nvPr/>
         </p:nvSpPr>
         <p:spPr>
           <a:xfrm>
-            <a:off x="9699764" y="2328864"/>
+            <a:off x="1069930" y="102584"/>
+            <a:ext cx="1555426" cy="400110"/>
+          </a:xfrm>
+          <a:prstGeom prst="rect">
+            <a:avLst/>
+          </a:prstGeom>
+        </p:spPr>
+        <p:txBody>
+          <a:bodyPr wrap="none">
+            <a:spAutoFit/>
+          </a:bodyPr>
+          <a:lstStyle/>
+          <a:p>
+            <a:r>
+              <a:rPr lang="en-US" sz="2000" b="1" dirty="0" smtClean="0"/>
+              <a:t>Original data</a:t>
+            </a:r>
+            <a:endParaRPr lang="en-US" sz="2000" b="1" dirty="0"/>
+          </a:p>
+        </p:txBody>
+      </p:sp>
+      <p:sp>
+        <p:nvSpPr>
+          <p:cNvPr id="20" name="Rectangle 19"/>
+          <p:cNvSpPr/>
+          <p:nvPr/>
+        </p:nvSpPr>
+        <p:spPr>
+          <a:xfrm>
+            <a:off x="5145578" y="88432"/>
+            <a:ext cx="1971630" cy="400110"/>
+          </a:xfrm>
+          <a:prstGeom prst="rect">
+            <a:avLst/>
+          </a:prstGeom>
+        </p:spPr>
+        <p:txBody>
+          <a:bodyPr wrap="none">
+            <a:spAutoFit/>
+          </a:bodyPr>
+          <a:lstStyle/>
+          <a:p>
+            <a:r>
+              <a:rPr lang="en-US" sz="2000" b="1" dirty="0" smtClean="0"/>
+              <a:t>Hexagon Binning</a:t>
+            </a:r>
+            <a:endParaRPr lang="en-US" sz="2000" b="1" dirty="0"/>
+          </a:p>
+        </p:txBody>
+      </p:sp>
+      <p:sp>
+        <p:nvSpPr>
+          <p:cNvPr id="21" name="Rectangle 20"/>
+          <p:cNvSpPr/>
+          <p:nvPr/>
+        </p:nvSpPr>
+        <p:spPr>
+          <a:xfrm>
+            <a:off x="9117490" y="105058"/>
+            <a:ext cx="1771639" cy="400110"/>
+          </a:xfrm>
+          <a:prstGeom prst="rect">
+            <a:avLst/>
+          </a:prstGeom>
+        </p:spPr>
+        <p:txBody>
+          <a:bodyPr wrap="none">
+            <a:spAutoFit/>
+          </a:bodyPr>
+          <a:lstStyle/>
+          <a:p>
+            <a:r>
+              <a:rPr lang="en-US" sz="2000" b="1" dirty="0" smtClean="0"/>
+              <a:t>Leader Binning</a:t>
+            </a:r>
+            <a:endParaRPr lang="en-US" sz="2000" b="1" dirty="0"/>
+          </a:p>
+        </p:txBody>
+      </p:sp>
+    </p:spTree>
+    <p:extLst>
+      <p:ext uri="{BB962C8B-B14F-4D97-AF65-F5344CB8AC3E}">
+        <p14:creationId xmlns:p14="http://schemas.microsoft.com/office/powerpoint/2010/main" val="36231481"/>
+      </p:ext>
+    </p:extLst>
+  </p:cSld>
+  <p:clrMapOvr>
+    <a:masterClrMapping/>
+  </p:clrMapOvr>
+  <p:timing>
+    <p:tnLst>
+      <p:par>
+        <p:cTn id="1" dur="indefinite" restart="never" nodeType="tmRoot"/>
+      </p:par>
+    </p:tnLst>
+  </p:timing>
+</p:sld>
+</file>
+
+<file path=ppt/slides/slide4.xml><?xml version="1.0" encoding="utf-8"?>
+<p:sld xmlns:a="http://schemas.openxmlformats.org/drawingml/2006/main" xmlns:r="http://schemas.openxmlformats.org/officeDocument/2006/relationships" xmlns:p="http://schemas.openxmlformats.org/presentationml/2006/main">
+  <p:cSld>
+    <p:spTree>
+      <p:nvGrpSpPr>
+        <p:cNvPr id="1" name=""/>
+        <p:cNvGrpSpPr/>
+        <p:nvPr/>
+      </p:nvGrpSpPr>
+      <p:grpSpPr>
+        <a:xfrm>
+          <a:off x="0" y="0"/>
+          <a:ext cx="0" cy="0"/>
+          <a:chOff x="0" y="0"/>
+          <a:chExt cx="0" cy="0"/>
+        </a:xfrm>
+      </p:grpSpPr>
+      <p:pic>
+        <p:nvPicPr>
+          <p:cNvPr id="15" name="Picture 14">
+            <a:extLst>
+              <a:ext uri="{FF2B5EF4-FFF2-40B4-BE49-F238E27FC236}">
+                <a16:creationId xmlns:a16="http://schemas.microsoft.com/office/drawing/2014/main" xmlns="" id="{355E5CA3-D80A-2841-B852-56E4A09607F2}"/>
+              </a:ext>
+            </a:extLst>
+          </p:cNvPr>
+          <p:cNvPicPr>
+            <a:picLocks noChangeAspect="1"/>
+          </p:cNvPicPr>
+          <p:nvPr/>
+        </p:nvPicPr>
+        <p:blipFill>
+          <a:blip r:embed="rId3"/>
+          <a:stretch>
+            <a:fillRect/>
+          </a:stretch>
+        </p:blipFill>
+        <p:spPr>
+          <a:xfrm>
+            <a:off x="8189397" y="344340"/>
+            <a:ext cx="2883655" cy="2872347"/>
+          </a:xfrm>
+          <a:prstGeom prst="rect">
+            <a:avLst/>
+          </a:prstGeom>
+        </p:spPr>
+      </p:pic>
+      <p:sp>
+        <p:nvSpPr>
+          <p:cNvPr id="16" name="Oval 15">
+            <a:extLst>
+              <a:ext uri="{FF2B5EF4-FFF2-40B4-BE49-F238E27FC236}">
+                <a16:creationId xmlns:a16="http://schemas.microsoft.com/office/drawing/2014/main" xmlns="" id="{8616F469-33AB-CE43-906B-730C2FE2A5EA}"/>
+              </a:ext>
+            </a:extLst>
+          </p:cNvPr>
+          <p:cNvSpPr/>
+          <p:nvPr/>
+        </p:nvSpPr>
+        <p:spPr>
+          <a:xfrm>
+            <a:off x="10007739" y="1819277"/>
             <a:ext cx="60324" cy="60324"/>
           </a:xfrm>
           <a:prstGeom prst="ellipse">
@@ -3970,162 +5191,10 @@
       </p:sp>
       <p:sp>
         <p:nvSpPr>
-          <p:cNvPr id="19" name="TextBox 18">
-            <a:extLst>
-              <a:ext uri="{FF2B5EF4-FFF2-40B4-BE49-F238E27FC236}">
-                <a16:creationId xmlns="" xmlns:a16="http://schemas.microsoft.com/office/drawing/2014/main" id="{C898E21A-C76A-6A49-921D-4203C4923B22}"/>
-              </a:ext>
-            </a:extLst>
-          </p:cNvPr>
-          <p:cNvSpPr txBox="1"/>
-          <p:nvPr/>
-        </p:nvSpPr>
-        <p:spPr>
-          <a:xfrm>
-            <a:off x="10033732" y="1641022"/>
-            <a:ext cx="507383" cy="338554"/>
-          </a:xfrm>
-          <a:prstGeom prst="rect">
-            <a:avLst/>
-          </a:prstGeom>
-          <a:noFill/>
-        </p:spPr>
-        <p:txBody>
-          <a:bodyPr wrap="none" rtlCol="0">
-            <a:spAutoFit/>
-          </a:bodyPr>
-          <a:lstStyle/>
-          <a:p>
-            <a:r>
-              <a:rPr lang="en-US" sz="1600" b="1" dirty="0" err="1">
-                <a:solidFill>
-                  <a:srgbClr val="C00000"/>
-                </a:solidFill>
-              </a:rPr>
-              <a:t>Irag</a:t>
-            </a:r>
-            <a:endParaRPr lang="en-US" sz="1600" b="1" dirty="0">
-              <a:solidFill>
-                <a:srgbClr val="C00000"/>
-              </a:solidFill>
-            </a:endParaRPr>
-          </a:p>
-        </p:txBody>
-      </p:sp>
-      <p:sp>
-        <p:nvSpPr>
-          <p:cNvPr id="20" name="TextBox 19">
-            <a:extLst>
-              <a:ext uri="{FF2B5EF4-FFF2-40B4-BE49-F238E27FC236}">
-                <a16:creationId xmlns="" xmlns:a16="http://schemas.microsoft.com/office/drawing/2014/main" id="{72F33AAF-7B6B-AF43-BB20-3A01AE8A5FDD}"/>
-              </a:ext>
-            </a:extLst>
-          </p:cNvPr>
-          <p:cNvSpPr txBox="1"/>
-          <p:nvPr/>
-        </p:nvSpPr>
-        <p:spPr>
-          <a:xfrm>
-            <a:off x="9840850" y="1922661"/>
-            <a:ext cx="1119537" cy="338554"/>
-          </a:xfrm>
-          <a:prstGeom prst="rect">
-            <a:avLst/>
-          </a:prstGeom>
-          <a:noFill/>
-        </p:spPr>
-        <p:txBody>
-          <a:bodyPr wrap="none" rtlCol="0">
-            <a:spAutoFit/>
-          </a:bodyPr>
-          <a:lstStyle/>
-          <a:p>
-            <a:r>
-              <a:rPr lang="en-US" sz="1600" b="1" dirty="0">
-                <a:solidFill>
-                  <a:srgbClr val="C00000"/>
-                </a:solidFill>
-              </a:rPr>
-              <a:t>El Salvador</a:t>
-            </a:r>
-          </a:p>
-        </p:txBody>
-      </p:sp>
-      <p:sp>
-        <p:nvSpPr>
-          <p:cNvPr id="21" name="TextBox 20">
-            <a:extLst>
-              <a:ext uri="{FF2B5EF4-FFF2-40B4-BE49-F238E27FC236}">
-                <a16:creationId xmlns="" xmlns:a16="http://schemas.microsoft.com/office/drawing/2014/main" id="{1A7FFB39-FD1F-1D4B-86E6-2E6E1992970C}"/>
-              </a:ext>
-            </a:extLst>
-          </p:cNvPr>
-          <p:cNvSpPr txBox="1"/>
-          <p:nvPr/>
-        </p:nvSpPr>
-        <p:spPr>
-          <a:xfrm>
-            <a:off x="9724463" y="2221861"/>
-            <a:ext cx="520207" cy="338554"/>
-          </a:xfrm>
-          <a:prstGeom prst="rect">
-            <a:avLst/>
-          </a:prstGeom>
-          <a:noFill/>
-        </p:spPr>
-        <p:txBody>
-          <a:bodyPr wrap="none" rtlCol="0">
-            <a:spAutoFit/>
-          </a:bodyPr>
-          <a:lstStyle/>
-          <a:p>
-            <a:r>
-              <a:rPr lang="en-US" sz="1600" b="1" dirty="0">
-                <a:solidFill>
-                  <a:srgbClr val="C00000"/>
-                </a:solidFill>
-              </a:rPr>
-              <a:t>Iran</a:t>
-            </a:r>
-          </a:p>
-        </p:txBody>
-      </p:sp>
-      <p:pic>
-        <p:nvPicPr>
-          <p:cNvPr id="27" name="Picture 26">
-            <a:extLst>
-              <a:ext uri="{FF2B5EF4-FFF2-40B4-BE49-F238E27FC236}">
-                <a16:creationId xmlns="" xmlns:a16="http://schemas.microsoft.com/office/drawing/2014/main" id="{A6540A91-8890-2744-8272-92F26420788B}"/>
-              </a:ext>
-            </a:extLst>
-          </p:cNvPr>
-          <p:cNvPicPr>
-            <a:picLocks noChangeAspect="1"/>
-          </p:cNvPicPr>
-          <p:nvPr/>
-        </p:nvPicPr>
-        <p:blipFill>
-          <a:blip r:embed="rId4"/>
-          <a:stretch>
-            <a:fillRect/>
-          </a:stretch>
-        </p:blipFill>
-        <p:spPr>
-          <a:xfrm>
-            <a:off x="890128" y="328428"/>
-            <a:ext cx="2902745" cy="2891317"/>
-          </a:xfrm>
-          <a:prstGeom prst="rect">
-            <a:avLst/>
-          </a:prstGeom>
-        </p:spPr>
-      </p:pic>
-      <p:sp>
-        <p:nvSpPr>
-          <p:cNvPr id="28" name="Oval 27">
-            <a:extLst>
-              <a:ext uri="{FF2B5EF4-FFF2-40B4-BE49-F238E27FC236}">
-                <a16:creationId xmlns="" xmlns:a16="http://schemas.microsoft.com/office/drawing/2014/main" id="{14009797-3A1A-2145-8956-A5360DDA1B40}"/>
+          <p:cNvPr id="17" name="Oval 16">
+            <a:extLst>
+              <a:ext uri="{FF2B5EF4-FFF2-40B4-BE49-F238E27FC236}">
+                <a16:creationId xmlns:a16="http://schemas.microsoft.com/office/drawing/2014/main" xmlns="" id="{B1AB838A-8EFB-D64A-B409-9195562B79CC}"/>
               </a:ext>
             </a:extLst>
           </p:cNvPr>
@@ -4134,7 +5203,7 @@
         </p:nvSpPr>
         <p:spPr>
           <a:xfrm>
-            <a:off x="1787209" y="497433"/>
+            <a:off x="9826764" y="2016127"/>
             <a:ext cx="60324" cy="60324"/>
           </a:xfrm>
           <a:prstGeom prst="ellipse">
@@ -4168,7 +5237,7 @@
           <a:lstStyle/>
           <a:p>
             <a:pPr algn="ctr"/>
-            <a:endParaRPr lang="en-US" b="1">
+            <a:endParaRPr lang="en-US">
               <a:solidFill>
                 <a:srgbClr val="FF0000"/>
               </a:solidFill>
@@ -4178,10 +5247,10 @@
       </p:sp>
       <p:sp>
         <p:nvSpPr>
-          <p:cNvPr id="29" name="Oval 28">
-            <a:extLst>
-              <a:ext uri="{FF2B5EF4-FFF2-40B4-BE49-F238E27FC236}">
-                <a16:creationId xmlns="" xmlns:a16="http://schemas.microsoft.com/office/drawing/2014/main" id="{9944FA39-1E15-FD43-B211-CB0511AF5D08}"/>
+          <p:cNvPr id="18" name="Oval 17">
+            <a:extLst>
+              <a:ext uri="{FF2B5EF4-FFF2-40B4-BE49-F238E27FC236}">
+                <a16:creationId xmlns:a16="http://schemas.microsoft.com/office/drawing/2014/main" xmlns="" id="{969F11EE-EAAE-5348-82FA-B4BD9494C144}"/>
               </a:ext>
             </a:extLst>
           </p:cNvPr>
@@ -4190,7 +5259,7 @@
         </p:nvSpPr>
         <p:spPr>
           <a:xfrm>
-            <a:off x="3144036" y="427583"/>
+            <a:off x="9699764" y="2328864"/>
             <a:ext cx="60324" cy="60324"/>
           </a:xfrm>
           <a:prstGeom prst="ellipse">
@@ -4224,7 +5293,7 @@
           <a:lstStyle/>
           <a:p>
             <a:pPr algn="ctr"/>
-            <a:endParaRPr lang="en-US" b="1">
+            <a:endParaRPr lang="en-US">
               <a:solidFill>
                 <a:srgbClr val="FF0000"/>
               </a:solidFill>
@@ -4234,10 +5303,10 @@
       </p:sp>
       <p:sp>
         <p:nvSpPr>
-          <p:cNvPr id="31" name="TextBox 30">
-            <a:extLst>
-              <a:ext uri="{FF2B5EF4-FFF2-40B4-BE49-F238E27FC236}">
-                <a16:creationId xmlns="" xmlns:a16="http://schemas.microsoft.com/office/drawing/2014/main" id="{09D4D375-67F5-2245-8689-C0980EA1850B}"/>
+          <p:cNvPr id="19" name="TextBox 18">
+            <a:extLst>
+              <a:ext uri="{FF2B5EF4-FFF2-40B4-BE49-F238E27FC236}">
+                <a16:creationId xmlns:a16="http://schemas.microsoft.com/office/drawing/2014/main" xmlns="" id="{C898E21A-C76A-6A49-921D-4203C4923B22}"/>
               </a:ext>
             </a:extLst>
           </p:cNvPr>
@@ -4246,8 +5315,52 @@
         </p:nvSpPr>
         <p:spPr>
           <a:xfrm>
-            <a:off x="1492602" y="534225"/>
-            <a:ext cx="611065" cy="338554"/>
+            <a:off x="10033732" y="1641022"/>
+            <a:ext cx="507383" cy="338554"/>
+          </a:xfrm>
+          <a:prstGeom prst="rect">
+            <a:avLst/>
+          </a:prstGeom>
+          <a:noFill/>
+        </p:spPr>
+        <p:txBody>
+          <a:bodyPr wrap="none" rtlCol="0">
+            <a:spAutoFit/>
+          </a:bodyPr>
+          <a:lstStyle/>
+          <a:p>
+            <a:r>
+              <a:rPr lang="en-US" sz="1600" b="1" dirty="0" err="1">
+                <a:solidFill>
+                  <a:srgbClr val="C00000"/>
+                </a:solidFill>
+              </a:rPr>
+              <a:t>Irag</a:t>
+            </a:r>
+            <a:endParaRPr lang="en-US" sz="1600" b="1" dirty="0">
+              <a:solidFill>
+                <a:srgbClr val="C00000"/>
+              </a:solidFill>
+            </a:endParaRPr>
+          </a:p>
+        </p:txBody>
+      </p:sp>
+      <p:sp>
+        <p:nvSpPr>
+          <p:cNvPr id="20" name="TextBox 19">
+            <a:extLst>
+              <a:ext uri="{FF2B5EF4-FFF2-40B4-BE49-F238E27FC236}">
+                <a16:creationId xmlns:a16="http://schemas.microsoft.com/office/drawing/2014/main" xmlns="" id="{72F33AAF-7B6B-AF43-BB20-3A01AE8A5FDD}"/>
+              </a:ext>
+            </a:extLst>
+          </p:cNvPr>
+          <p:cNvSpPr txBox="1"/>
+          <p:nvPr/>
+        </p:nvSpPr>
+        <p:spPr>
+          <a:xfrm>
+            <a:off x="9840850" y="1922661"/>
+            <a:ext cx="1119537" cy="338554"/>
           </a:xfrm>
           <a:prstGeom prst="rect">
             <a:avLst/>
@@ -4266,17 +5379,17 @@
                   <a:srgbClr val="C00000"/>
                 </a:solidFill>
               </a:rPr>
-              <a:t>India</a:t>
-            </a:r>
-          </a:p>
-        </p:txBody>
-      </p:sp>
-      <p:sp>
-        <p:nvSpPr>
-          <p:cNvPr id="32" name="TextBox 31">
-            <a:extLst>
-              <a:ext uri="{FF2B5EF4-FFF2-40B4-BE49-F238E27FC236}">
-                <a16:creationId xmlns="" xmlns:a16="http://schemas.microsoft.com/office/drawing/2014/main" id="{C1289FD4-3A37-EE47-A82F-797C22E17360}"/>
+              <a:t>El Salvador</a:t>
+            </a:r>
+          </a:p>
+        </p:txBody>
+      </p:sp>
+      <p:sp>
+        <p:nvSpPr>
+          <p:cNvPr id="21" name="TextBox 20">
+            <a:extLst>
+              <a:ext uri="{FF2B5EF4-FFF2-40B4-BE49-F238E27FC236}">
+                <a16:creationId xmlns:a16="http://schemas.microsoft.com/office/drawing/2014/main" xmlns="" id="{1A7FFB39-FD1F-1D4B-86E6-2E6E1992970C}"/>
               </a:ext>
             </a:extLst>
           </p:cNvPr>
@@ -4285,8 +5398,8 @@
         </p:nvSpPr>
         <p:spPr>
           <a:xfrm>
-            <a:off x="2812172" y="467025"/>
-            <a:ext cx="665567" cy="338554"/>
+            <a:off x="9724463" y="2221861"/>
+            <a:ext cx="520207" cy="338554"/>
           </a:xfrm>
           <a:prstGeom prst="rect">
             <a:avLst/>
@@ -4305,56 +5418,47 @@
                   <a:srgbClr val="C00000"/>
                 </a:solidFill>
               </a:rPr>
-              <a:t>China</a:t>
-            </a:r>
-          </a:p>
-        </p:txBody>
-      </p:sp>
-      <p:sp>
-        <p:nvSpPr>
-          <p:cNvPr id="33" name="TextBox 32">
-            <a:extLst>
-              <a:ext uri="{FF2B5EF4-FFF2-40B4-BE49-F238E27FC236}">
-                <a16:creationId xmlns="" xmlns:a16="http://schemas.microsoft.com/office/drawing/2014/main" id="{F6EA0B3D-D3D4-7845-80BE-BF9FD02CB299}"/>
-              </a:ext>
-            </a:extLst>
-          </p:cNvPr>
-          <p:cNvSpPr txBox="1"/>
+              <a:t>Iran</a:t>
+            </a:r>
+          </a:p>
+        </p:txBody>
+      </p:sp>
+      <p:pic>
+        <p:nvPicPr>
+          <p:cNvPr id="27" name="Picture 26">
+            <a:extLst>
+              <a:ext uri="{FF2B5EF4-FFF2-40B4-BE49-F238E27FC236}">
+                <a16:creationId xmlns:a16="http://schemas.microsoft.com/office/drawing/2014/main" xmlns="" id="{A6540A91-8890-2744-8272-92F26420788B}"/>
+              </a:ext>
+            </a:extLst>
+          </p:cNvPr>
+          <p:cNvPicPr>
+            <a:picLocks noChangeAspect="1"/>
+          </p:cNvPicPr>
           <p:nvPr/>
-        </p:nvSpPr>
-        <p:spPr>
-          <a:xfrm>
-            <a:off x="2940300" y="2360189"/>
-            <a:ext cx="898003" cy="338554"/>
+        </p:nvPicPr>
+        <p:blipFill>
+          <a:blip r:embed="rId4"/>
+          <a:stretch>
+            <a:fillRect/>
+          </a:stretch>
+        </p:blipFill>
+        <p:spPr>
+          <a:xfrm>
+            <a:off x="890128" y="328428"/>
+            <a:ext cx="2902745" cy="2891317"/>
           </a:xfrm>
           <a:prstGeom prst="rect">
             <a:avLst/>
           </a:prstGeom>
-          <a:noFill/>
-        </p:spPr>
-        <p:txBody>
-          <a:bodyPr wrap="none" rtlCol="0">
-            <a:spAutoFit/>
-          </a:bodyPr>
-          <a:lstStyle/>
-          <a:p>
-            <a:r>
-              <a:rPr lang="en-US" sz="1600" b="1" dirty="0">
-                <a:solidFill>
-                  <a:srgbClr val="C00000"/>
-                </a:solidFill>
-              </a:rPr>
-              <a:t>Pakistan</a:t>
-            </a:r>
-          </a:p>
-        </p:txBody>
-      </p:sp>
-      <p:sp>
-        <p:nvSpPr>
-          <p:cNvPr id="34" name="Oval 33">
-            <a:extLst>
-              <a:ext uri="{FF2B5EF4-FFF2-40B4-BE49-F238E27FC236}">
-                <a16:creationId xmlns="" xmlns:a16="http://schemas.microsoft.com/office/drawing/2014/main" id="{D23EA8F7-86EF-D348-A538-64BEF297910C}"/>
+        </p:spPr>
+      </p:pic>
+      <p:sp>
+        <p:nvSpPr>
+          <p:cNvPr id="28" name="Oval 27">
+            <a:extLst>
+              <a:ext uri="{FF2B5EF4-FFF2-40B4-BE49-F238E27FC236}">
+                <a16:creationId xmlns:a16="http://schemas.microsoft.com/office/drawing/2014/main" xmlns="" id="{14009797-3A1A-2145-8956-A5360DDA1B40}"/>
               </a:ext>
             </a:extLst>
           </p:cNvPr>
@@ -4363,7 +5467,7 @@
         </p:nvSpPr>
         <p:spPr>
           <a:xfrm>
-            <a:off x="3622583" y="2674747"/>
+            <a:off x="1787209" y="497433"/>
             <a:ext cx="60324" cy="60324"/>
           </a:xfrm>
           <a:prstGeom prst="ellipse">
@@ -4405,12 +5509,241 @@
           </a:p>
         </p:txBody>
       </p:sp>
+      <p:sp>
+        <p:nvSpPr>
+          <p:cNvPr id="29" name="Oval 28">
+            <a:extLst>
+              <a:ext uri="{FF2B5EF4-FFF2-40B4-BE49-F238E27FC236}">
+                <a16:creationId xmlns:a16="http://schemas.microsoft.com/office/drawing/2014/main" xmlns="" id="{9944FA39-1E15-FD43-B211-CB0511AF5D08}"/>
+              </a:ext>
+            </a:extLst>
+          </p:cNvPr>
+          <p:cNvSpPr/>
+          <p:nvPr/>
+        </p:nvSpPr>
+        <p:spPr>
+          <a:xfrm>
+            <a:off x="3144036" y="427583"/>
+            <a:ext cx="60324" cy="60324"/>
+          </a:xfrm>
+          <a:prstGeom prst="ellipse">
+            <a:avLst/>
+          </a:prstGeom>
+          <a:noFill/>
+          <a:ln w="19050">
+            <a:solidFill>
+              <a:srgbClr val="FF0000"/>
+            </a:solidFill>
+          </a:ln>
+        </p:spPr>
+        <p:style>
+          <a:lnRef idx="2">
+            <a:schemeClr val="accent1">
+              <a:shade val="50000"/>
+            </a:schemeClr>
+          </a:lnRef>
+          <a:fillRef idx="1">
+            <a:schemeClr val="accent1"/>
+          </a:fillRef>
+          <a:effectRef idx="0">
+            <a:schemeClr val="accent1"/>
+          </a:effectRef>
+          <a:fontRef idx="minor">
+            <a:schemeClr val="lt1"/>
+          </a:fontRef>
+        </p:style>
+        <p:txBody>
+          <a:bodyPr rtlCol="0" anchor="ctr"/>
+          <a:lstStyle/>
+          <a:p>
+            <a:pPr algn="ctr"/>
+            <a:endParaRPr lang="en-US" b="1">
+              <a:solidFill>
+                <a:srgbClr val="FF0000"/>
+              </a:solidFill>
+            </a:endParaRPr>
+          </a:p>
+        </p:txBody>
+      </p:sp>
+      <p:sp>
+        <p:nvSpPr>
+          <p:cNvPr id="31" name="TextBox 30">
+            <a:extLst>
+              <a:ext uri="{FF2B5EF4-FFF2-40B4-BE49-F238E27FC236}">
+                <a16:creationId xmlns:a16="http://schemas.microsoft.com/office/drawing/2014/main" xmlns="" id="{09D4D375-67F5-2245-8689-C0980EA1850B}"/>
+              </a:ext>
+            </a:extLst>
+          </p:cNvPr>
+          <p:cNvSpPr txBox="1"/>
+          <p:nvPr/>
+        </p:nvSpPr>
+        <p:spPr>
+          <a:xfrm>
+            <a:off x="1492602" y="534225"/>
+            <a:ext cx="611065" cy="338554"/>
+          </a:xfrm>
+          <a:prstGeom prst="rect">
+            <a:avLst/>
+          </a:prstGeom>
+          <a:noFill/>
+        </p:spPr>
+        <p:txBody>
+          <a:bodyPr wrap="none" rtlCol="0">
+            <a:spAutoFit/>
+          </a:bodyPr>
+          <a:lstStyle/>
+          <a:p>
+            <a:r>
+              <a:rPr lang="en-US" sz="1600" b="1" dirty="0">
+                <a:solidFill>
+                  <a:srgbClr val="C00000"/>
+                </a:solidFill>
+              </a:rPr>
+              <a:t>India</a:t>
+            </a:r>
+          </a:p>
+        </p:txBody>
+      </p:sp>
+      <p:sp>
+        <p:nvSpPr>
+          <p:cNvPr id="32" name="TextBox 31">
+            <a:extLst>
+              <a:ext uri="{FF2B5EF4-FFF2-40B4-BE49-F238E27FC236}">
+                <a16:creationId xmlns:a16="http://schemas.microsoft.com/office/drawing/2014/main" xmlns="" id="{C1289FD4-3A37-EE47-A82F-797C22E17360}"/>
+              </a:ext>
+            </a:extLst>
+          </p:cNvPr>
+          <p:cNvSpPr txBox="1"/>
+          <p:nvPr/>
+        </p:nvSpPr>
+        <p:spPr>
+          <a:xfrm>
+            <a:off x="2812172" y="467025"/>
+            <a:ext cx="665567" cy="338554"/>
+          </a:xfrm>
+          <a:prstGeom prst="rect">
+            <a:avLst/>
+          </a:prstGeom>
+          <a:noFill/>
+        </p:spPr>
+        <p:txBody>
+          <a:bodyPr wrap="none" rtlCol="0">
+            <a:spAutoFit/>
+          </a:bodyPr>
+          <a:lstStyle/>
+          <a:p>
+            <a:r>
+              <a:rPr lang="en-US" sz="1600" b="1" dirty="0">
+                <a:solidFill>
+                  <a:srgbClr val="C00000"/>
+                </a:solidFill>
+              </a:rPr>
+              <a:t>China</a:t>
+            </a:r>
+          </a:p>
+        </p:txBody>
+      </p:sp>
+      <p:sp>
+        <p:nvSpPr>
+          <p:cNvPr id="33" name="TextBox 32">
+            <a:extLst>
+              <a:ext uri="{FF2B5EF4-FFF2-40B4-BE49-F238E27FC236}">
+                <a16:creationId xmlns:a16="http://schemas.microsoft.com/office/drawing/2014/main" xmlns="" id="{F6EA0B3D-D3D4-7845-80BE-BF9FD02CB299}"/>
+              </a:ext>
+            </a:extLst>
+          </p:cNvPr>
+          <p:cNvSpPr txBox="1"/>
+          <p:nvPr/>
+        </p:nvSpPr>
+        <p:spPr>
+          <a:xfrm>
+            <a:off x="2940300" y="2360189"/>
+            <a:ext cx="898003" cy="338554"/>
+          </a:xfrm>
+          <a:prstGeom prst="rect">
+            <a:avLst/>
+          </a:prstGeom>
+          <a:noFill/>
+        </p:spPr>
+        <p:txBody>
+          <a:bodyPr wrap="none" rtlCol="0">
+            <a:spAutoFit/>
+          </a:bodyPr>
+          <a:lstStyle/>
+          <a:p>
+            <a:r>
+              <a:rPr lang="en-US" sz="1600" b="1" dirty="0">
+                <a:solidFill>
+                  <a:srgbClr val="C00000"/>
+                </a:solidFill>
+              </a:rPr>
+              <a:t>Pakistan</a:t>
+            </a:r>
+          </a:p>
+        </p:txBody>
+      </p:sp>
+      <p:sp>
+        <p:nvSpPr>
+          <p:cNvPr id="34" name="Oval 33">
+            <a:extLst>
+              <a:ext uri="{FF2B5EF4-FFF2-40B4-BE49-F238E27FC236}">
+                <a16:creationId xmlns:a16="http://schemas.microsoft.com/office/drawing/2014/main" xmlns="" id="{D23EA8F7-86EF-D348-A538-64BEF297910C}"/>
+              </a:ext>
+            </a:extLst>
+          </p:cNvPr>
+          <p:cNvSpPr/>
+          <p:nvPr/>
+        </p:nvSpPr>
+        <p:spPr>
+          <a:xfrm>
+            <a:off x="3622583" y="2674747"/>
+            <a:ext cx="60324" cy="60324"/>
+          </a:xfrm>
+          <a:prstGeom prst="ellipse">
+            <a:avLst/>
+          </a:prstGeom>
+          <a:noFill/>
+          <a:ln w="19050">
+            <a:solidFill>
+              <a:srgbClr val="FF0000"/>
+            </a:solidFill>
+          </a:ln>
+        </p:spPr>
+        <p:style>
+          <a:lnRef idx="2">
+            <a:schemeClr val="accent1">
+              <a:shade val="50000"/>
+            </a:schemeClr>
+          </a:lnRef>
+          <a:fillRef idx="1">
+            <a:schemeClr val="accent1"/>
+          </a:fillRef>
+          <a:effectRef idx="0">
+            <a:schemeClr val="accent1"/>
+          </a:effectRef>
+          <a:fontRef idx="minor">
+            <a:schemeClr val="lt1"/>
+          </a:fontRef>
+        </p:style>
+        <p:txBody>
+          <a:bodyPr rtlCol="0" anchor="ctr"/>
+          <a:lstStyle/>
+          <a:p>
+            <a:pPr algn="ctr"/>
+            <a:endParaRPr lang="en-US" b="1">
+              <a:solidFill>
+                <a:srgbClr val="FF0000"/>
+              </a:solidFill>
+            </a:endParaRPr>
+          </a:p>
+        </p:txBody>
+      </p:sp>
       <p:grpSp>
         <p:nvGrpSpPr>
           <p:cNvPr id="37" name="Group 36">
             <a:extLst>
               <a:ext uri="{FF2B5EF4-FFF2-40B4-BE49-F238E27FC236}">
-                <a16:creationId xmlns="" xmlns:a16="http://schemas.microsoft.com/office/drawing/2014/main" id="{0644DF61-0709-8344-9946-F69EA440162E}"/>
+                <a16:creationId xmlns:a16="http://schemas.microsoft.com/office/drawing/2014/main" xmlns="" id="{0644DF61-0709-8344-9946-F69EA440162E}"/>
               </a:ext>
             </a:extLst>
           </p:cNvPr>
@@ -4430,7 +5763,7 @@
             <p:cNvPr id="4" name="Picture 3">
               <a:extLst>
                 <a:ext uri="{FF2B5EF4-FFF2-40B4-BE49-F238E27FC236}">
-                  <a16:creationId xmlns="" xmlns:a16="http://schemas.microsoft.com/office/drawing/2014/main" id="{A4005698-7926-E94C-A16D-9FBB5DC638A6}"/>
+                  <a16:creationId xmlns:a16="http://schemas.microsoft.com/office/drawing/2014/main" xmlns="" id="{A4005698-7926-E94C-A16D-9FBB5DC638A6}"/>
                 </a:ext>
               </a:extLst>
             </p:cNvPr>
@@ -4460,7 +5793,7 @@
             <p:cNvPr id="5" name="Oval 4">
               <a:extLst>
                 <a:ext uri="{FF2B5EF4-FFF2-40B4-BE49-F238E27FC236}">
-                  <a16:creationId xmlns="" xmlns:a16="http://schemas.microsoft.com/office/drawing/2014/main" id="{3D2A1AD8-6DDC-BB46-ADA4-7C2D13973D89}"/>
+                  <a16:creationId xmlns:a16="http://schemas.microsoft.com/office/drawing/2014/main" xmlns="" id="{3D2A1AD8-6DDC-BB46-ADA4-7C2D13973D89}"/>
                 </a:ext>
               </a:extLst>
             </p:cNvPr>
@@ -4516,7 +5849,7 @@
             <p:cNvPr id="6" name="Oval 5">
               <a:extLst>
                 <a:ext uri="{FF2B5EF4-FFF2-40B4-BE49-F238E27FC236}">
-                  <a16:creationId xmlns="" xmlns:a16="http://schemas.microsoft.com/office/drawing/2014/main" id="{7307E3EC-7853-824A-8B1D-7423C0B417AD}"/>
+                  <a16:creationId xmlns:a16="http://schemas.microsoft.com/office/drawing/2014/main" xmlns="" id="{7307E3EC-7853-824A-8B1D-7423C0B417AD}"/>
                 </a:ext>
               </a:extLst>
             </p:cNvPr>
@@ -4572,7 +5905,7 @@
             <p:cNvPr id="7" name="Oval 6">
               <a:extLst>
                 <a:ext uri="{FF2B5EF4-FFF2-40B4-BE49-F238E27FC236}">
-                  <a16:creationId xmlns="" xmlns:a16="http://schemas.microsoft.com/office/drawing/2014/main" id="{5F27894F-1E0B-8E43-B4BF-CEA34CFD9E1F}"/>
+                  <a16:creationId xmlns:a16="http://schemas.microsoft.com/office/drawing/2014/main" xmlns="" id="{5F27894F-1E0B-8E43-B4BF-CEA34CFD9E1F}"/>
                 </a:ext>
               </a:extLst>
             </p:cNvPr>
@@ -4628,7 +5961,7 @@
             <p:cNvPr id="8" name="Oval 7">
               <a:extLst>
                 <a:ext uri="{FF2B5EF4-FFF2-40B4-BE49-F238E27FC236}">
-                  <a16:creationId xmlns="" xmlns:a16="http://schemas.microsoft.com/office/drawing/2014/main" id="{81C938D1-5665-7F4D-AAF3-DB662FA9F524}"/>
+                  <a16:creationId xmlns:a16="http://schemas.microsoft.com/office/drawing/2014/main" xmlns="" id="{81C938D1-5665-7F4D-AAF3-DB662FA9F524}"/>
                 </a:ext>
               </a:extLst>
             </p:cNvPr>
@@ -4684,7 +6017,7 @@
             <p:cNvPr id="9" name="Oval 8">
               <a:extLst>
                 <a:ext uri="{FF2B5EF4-FFF2-40B4-BE49-F238E27FC236}">
-                  <a16:creationId xmlns="" xmlns:a16="http://schemas.microsoft.com/office/drawing/2014/main" id="{7EFF9D67-8BF8-8945-8002-16C1CF8F03EA}"/>
+                  <a16:creationId xmlns:a16="http://schemas.microsoft.com/office/drawing/2014/main" xmlns="" id="{7EFF9D67-8BF8-8945-8002-16C1CF8F03EA}"/>
                 </a:ext>
               </a:extLst>
             </p:cNvPr>
@@ -4740,7 +6073,7 @@
             <p:cNvPr id="10" name="TextBox 9">
               <a:extLst>
                 <a:ext uri="{FF2B5EF4-FFF2-40B4-BE49-F238E27FC236}">
-                  <a16:creationId xmlns="" xmlns:a16="http://schemas.microsoft.com/office/drawing/2014/main" id="{D1662150-37F4-DF49-BA2D-22B5E9FEDBCF}"/>
+                  <a16:creationId xmlns:a16="http://schemas.microsoft.com/office/drawing/2014/main" xmlns="" id="{D1662150-37F4-DF49-BA2D-22B5E9FEDBCF}"/>
                 </a:ext>
               </a:extLst>
             </p:cNvPr>
@@ -4779,7 +6112,7 @@
             <p:cNvPr id="11" name="TextBox 10">
               <a:extLst>
                 <a:ext uri="{FF2B5EF4-FFF2-40B4-BE49-F238E27FC236}">
-                  <a16:creationId xmlns="" xmlns:a16="http://schemas.microsoft.com/office/drawing/2014/main" id="{64085B89-6EF3-A647-BA56-34751332AC95}"/>
+                  <a16:creationId xmlns:a16="http://schemas.microsoft.com/office/drawing/2014/main" xmlns="" id="{64085B89-6EF3-A647-BA56-34751332AC95}"/>
                 </a:ext>
               </a:extLst>
             </p:cNvPr>
@@ -4818,7 +6151,7 @@
             <p:cNvPr id="12" name="TextBox 11">
               <a:extLst>
                 <a:ext uri="{FF2B5EF4-FFF2-40B4-BE49-F238E27FC236}">
-                  <a16:creationId xmlns="" xmlns:a16="http://schemas.microsoft.com/office/drawing/2014/main" id="{2805C498-7113-F242-83C5-0CB3F48F7A56}"/>
+                  <a16:creationId xmlns:a16="http://schemas.microsoft.com/office/drawing/2014/main" xmlns="" id="{2805C498-7113-F242-83C5-0CB3F48F7A56}"/>
                 </a:ext>
               </a:extLst>
             </p:cNvPr>
@@ -4857,7 +6190,7 @@
             <p:cNvPr id="13" name="TextBox 12">
               <a:extLst>
                 <a:ext uri="{FF2B5EF4-FFF2-40B4-BE49-F238E27FC236}">
-                  <a16:creationId xmlns="" xmlns:a16="http://schemas.microsoft.com/office/drawing/2014/main" id="{7A558457-52F3-A245-8DF0-870E66350E43}"/>
+                  <a16:creationId xmlns:a16="http://schemas.microsoft.com/office/drawing/2014/main" xmlns="" id="{7A558457-52F3-A245-8DF0-870E66350E43}"/>
                 </a:ext>
               </a:extLst>
             </p:cNvPr>
@@ -4892,7 +6225,7 @@
             <p:cNvPr id="22" name="Picture 21">
               <a:extLst>
                 <a:ext uri="{FF2B5EF4-FFF2-40B4-BE49-F238E27FC236}">
-                  <a16:creationId xmlns="" xmlns:a16="http://schemas.microsoft.com/office/drawing/2014/main" id="{B17F22A6-4E5A-254D-AE97-DE01631719A8}"/>
+                  <a16:creationId xmlns:a16="http://schemas.microsoft.com/office/drawing/2014/main" xmlns="" id="{B17F22A6-4E5A-254D-AE97-DE01631719A8}"/>
                 </a:ext>
               </a:extLst>
             </p:cNvPr>
@@ -4922,7 +6255,7 @@
             <p:cNvPr id="23" name="Picture 22">
               <a:extLst>
                 <a:ext uri="{FF2B5EF4-FFF2-40B4-BE49-F238E27FC236}">
-                  <a16:creationId xmlns="" xmlns:a16="http://schemas.microsoft.com/office/drawing/2014/main" id="{01D2D8FB-9991-1643-9AB5-DEFD7E627540}"/>
+                  <a16:creationId xmlns:a16="http://schemas.microsoft.com/office/drawing/2014/main" xmlns="" id="{01D2D8FB-9991-1643-9AB5-DEFD7E627540}"/>
                 </a:ext>
               </a:extLst>
             </p:cNvPr>
@@ -4952,7 +6285,7 @@
             <p:cNvPr id="24" name="Picture 23">
               <a:extLst>
                 <a:ext uri="{FF2B5EF4-FFF2-40B4-BE49-F238E27FC236}">
-                  <a16:creationId xmlns="" xmlns:a16="http://schemas.microsoft.com/office/drawing/2014/main" id="{2D0FD0C0-0B76-E240-8056-53DA5A11A0C8}"/>
+                  <a16:creationId xmlns:a16="http://schemas.microsoft.com/office/drawing/2014/main" xmlns="" id="{2D0FD0C0-0B76-E240-8056-53DA5A11A0C8}"/>
                 </a:ext>
               </a:extLst>
             </p:cNvPr>
@@ -4982,7 +6315,7 @@
             <p:cNvPr id="26" name="Picture 25">
               <a:extLst>
                 <a:ext uri="{FF2B5EF4-FFF2-40B4-BE49-F238E27FC236}">
-                  <a16:creationId xmlns="" xmlns:a16="http://schemas.microsoft.com/office/drawing/2014/main" id="{700CAAFD-C3DE-944C-BCEC-9323BB3EE06E}"/>
+                  <a16:creationId xmlns:a16="http://schemas.microsoft.com/office/drawing/2014/main" xmlns="" id="{700CAAFD-C3DE-944C-BCEC-9323BB3EE06E}"/>
                 </a:ext>
               </a:extLst>
             </p:cNvPr>
@@ -5012,7 +6345,7 @@
             <p:cNvPr id="36" name="Picture 35">
               <a:extLst>
                 <a:ext uri="{FF2B5EF4-FFF2-40B4-BE49-F238E27FC236}">
-                  <a16:creationId xmlns="" xmlns:a16="http://schemas.microsoft.com/office/drawing/2014/main" id="{3EC1119B-A0DF-B740-9CF4-0F17ABF0AA04}"/>
+                  <a16:creationId xmlns:a16="http://schemas.microsoft.com/office/drawing/2014/main" xmlns="" id="{3EC1119B-A0DF-B740-9CF4-0F17ABF0AA04}"/>
                 </a:ext>
               </a:extLst>
             </p:cNvPr>
@@ -5042,7 +6375,7 @@
             <p:cNvPr id="14" name="TextBox 13">
               <a:extLst>
                 <a:ext uri="{FF2B5EF4-FFF2-40B4-BE49-F238E27FC236}">
-                  <a16:creationId xmlns="" xmlns:a16="http://schemas.microsoft.com/office/drawing/2014/main" id="{9C28B1FC-25B5-8347-97D6-FC01C28B788D}"/>
+                  <a16:creationId xmlns:a16="http://schemas.microsoft.com/office/drawing/2014/main" xmlns="" id="{9C28B1FC-25B5-8347-97D6-FC01C28B788D}"/>
                 </a:ext>
               </a:extLst>
             </p:cNvPr>
@@ -5082,7 +6415,7 @@
           <p:cNvPr id="39" name="TextBox 38">
             <a:extLst>
               <a:ext uri="{FF2B5EF4-FFF2-40B4-BE49-F238E27FC236}">
-                <a16:creationId xmlns="" xmlns:a16="http://schemas.microsoft.com/office/drawing/2014/main" id="{C66C5A2F-BA75-0949-83C8-45D7FF28896F}"/>
+                <a16:creationId xmlns:a16="http://schemas.microsoft.com/office/drawing/2014/main" xmlns="" id="{C66C5A2F-BA75-0949-83C8-45D7FF28896F}"/>
               </a:ext>
             </a:extLst>
           </p:cNvPr>
@@ -5117,7 +6450,7 @@
           <p:cNvPr id="40" name="TextBox 39">
             <a:extLst>
               <a:ext uri="{FF2B5EF4-FFF2-40B4-BE49-F238E27FC236}">
-                <a16:creationId xmlns="" xmlns:a16="http://schemas.microsoft.com/office/drawing/2014/main" id="{365AFC51-3C7E-464F-B296-27D9036ADED7}"/>
+                <a16:creationId xmlns:a16="http://schemas.microsoft.com/office/drawing/2014/main" xmlns="" id="{365AFC51-3C7E-464F-B296-27D9036ADED7}"/>
               </a:ext>
             </a:extLst>
           </p:cNvPr>
@@ -5152,7 +6485,7 @@
           <p:cNvPr id="41" name="TextBox 40">
             <a:extLst>
               <a:ext uri="{FF2B5EF4-FFF2-40B4-BE49-F238E27FC236}">
-                <a16:creationId xmlns="" xmlns:a16="http://schemas.microsoft.com/office/drawing/2014/main" id="{479F09AB-AB29-8249-AFA5-110EFACC8EA0}"/>
+                <a16:creationId xmlns:a16="http://schemas.microsoft.com/office/drawing/2014/main" xmlns="" id="{479F09AB-AB29-8249-AFA5-110EFACC8EA0}"/>
               </a:ext>
             </a:extLst>
           </p:cNvPr>
@@ -5187,7 +6520,7 @@
           <p:cNvPr id="42" name="TextBox 41">
             <a:extLst>
               <a:ext uri="{FF2B5EF4-FFF2-40B4-BE49-F238E27FC236}">
-                <a16:creationId xmlns="" xmlns:a16="http://schemas.microsoft.com/office/drawing/2014/main" id="{061EC807-E260-CC43-86EA-C09E5793FE2C}"/>
+                <a16:creationId xmlns:a16="http://schemas.microsoft.com/office/drawing/2014/main" xmlns="" id="{061EC807-E260-CC43-86EA-C09E5793FE2C}"/>
               </a:ext>
             </a:extLst>
           </p:cNvPr>
@@ -5222,7 +6555,7 @@
           <p:cNvPr id="43" name="TextBox 42">
             <a:extLst>
               <a:ext uri="{FF2B5EF4-FFF2-40B4-BE49-F238E27FC236}">
-                <a16:creationId xmlns="" xmlns:a16="http://schemas.microsoft.com/office/drawing/2014/main" id="{0798B99F-FCE0-7747-9AD4-297C36E91E7F}"/>
+                <a16:creationId xmlns:a16="http://schemas.microsoft.com/office/drawing/2014/main" xmlns="" id="{0798B99F-FCE0-7747-9AD4-297C36E91E7F}"/>
               </a:ext>
             </a:extLst>
           </p:cNvPr>
@@ -5257,7 +6590,7 @@
           <p:cNvPr id="44" name="TextBox 43">
             <a:extLst>
               <a:ext uri="{FF2B5EF4-FFF2-40B4-BE49-F238E27FC236}">
-                <a16:creationId xmlns="" xmlns:a16="http://schemas.microsoft.com/office/drawing/2014/main" id="{EEE6EF57-2722-3943-AC27-5E03A303F6AF}"/>
+                <a16:creationId xmlns:a16="http://schemas.microsoft.com/office/drawing/2014/main" xmlns="" id="{EEE6EF57-2722-3943-AC27-5E03A303F6AF}"/>
               </a:ext>
             </a:extLst>
           </p:cNvPr>
@@ -5292,7 +6625,7 @@
           <p:cNvPr id="45" name="TextBox 44">
             <a:extLst>
               <a:ext uri="{FF2B5EF4-FFF2-40B4-BE49-F238E27FC236}">
-                <a16:creationId xmlns="" xmlns:a16="http://schemas.microsoft.com/office/drawing/2014/main" id="{493A0C83-B296-0548-8A08-AFD01C89834F}"/>
+                <a16:creationId xmlns:a16="http://schemas.microsoft.com/office/drawing/2014/main" xmlns="" id="{493A0C83-B296-0548-8A08-AFD01C89834F}"/>
               </a:ext>
             </a:extLst>
           </p:cNvPr>
@@ -5503,7 +6836,7 @@
           <p:cNvPr id="46" name="TextBox 45">
             <a:extLst>
               <a:ext uri="{FF2B5EF4-FFF2-40B4-BE49-F238E27FC236}">
-                <a16:creationId xmlns="" xmlns:a16="http://schemas.microsoft.com/office/drawing/2014/main" id="{0798B99F-FCE0-7747-9AD4-297C36E91E7F}"/>
+                <a16:creationId xmlns:a16="http://schemas.microsoft.com/office/drawing/2014/main" xmlns="" id="{0798B99F-FCE0-7747-9AD4-297C36E91E7F}"/>
               </a:ext>
             </a:extLst>
           </p:cNvPr>
@@ -5539,7 +6872,7 @@
           <p:cNvPr id="47" name="TextBox 46">
             <a:extLst>
               <a:ext uri="{FF2B5EF4-FFF2-40B4-BE49-F238E27FC236}">
-                <a16:creationId xmlns="" xmlns:a16="http://schemas.microsoft.com/office/drawing/2014/main" id="{0798B99F-FCE0-7747-9AD4-297C36E91E7F}"/>
+                <a16:creationId xmlns:a16="http://schemas.microsoft.com/office/drawing/2014/main" xmlns="" id="{0798B99F-FCE0-7747-9AD4-297C36E91E7F}"/>
               </a:ext>
             </a:extLst>
           </p:cNvPr>
@@ -5575,7 +6908,7 @@
           <p:cNvPr id="48" name="TextBox 47">
             <a:extLst>
               <a:ext uri="{FF2B5EF4-FFF2-40B4-BE49-F238E27FC236}">
-                <a16:creationId xmlns="" xmlns:a16="http://schemas.microsoft.com/office/drawing/2014/main" id="{0798B99F-FCE0-7747-9AD4-297C36E91E7F}"/>
+                <a16:creationId xmlns:a16="http://schemas.microsoft.com/office/drawing/2014/main" xmlns="" id="{0798B99F-FCE0-7747-9AD4-297C36E91E7F}"/>
               </a:ext>
             </a:extLst>
           </p:cNvPr>
@@ -5610,843 +6943,6 @@
     <p:extLst>
       <p:ext uri="{BB962C8B-B14F-4D97-AF65-F5344CB8AC3E}">
         <p14:creationId xmlns:p14="http://schemas.microsoft.com/office/powerpoint/2010/main" val="3278785496"/>
-      </p:ext>
-    </p:extLst>
-  </p:cSld>
-  <p:clrMapOvr>
-    <a:masterClrMapping/>
-  </p:clrMapOvr>
-  <p:timing>
-    <p:tnLst>
-      <p:par>
-        <p:cTn id="1" dur="indefinite" restart="never" nodeType="tmRoot"/>
-      </p:par>
-    </p:tnLst>
-  </p:timing>
-</p:sld>
-</file>
-
-<file path=ppt/slides/slide2.xml><?xml version="1.0" encoding="utf-8"?>
-<p:sld xmlns:a="http://schemas.openxmlformats.org/drawingml/2006/main" xmlns:r="http://schemas.openxmlformats.org/officeDocument/2006/relationships" xmlns:p="http://schemas.openxmlformats.org/presentationml/2006/main">
-  <p:cSld>
-    <p:spTree>
-      <p:nvGrpSpPr>
-        <p:cNvPr id="1" name=""/>
-        <p:cNvGrpSpPr/>
-        <p:nvPr/>
-      </p:nvGrpSpPr>
-      <p:grpSpPr>
-        <a:xfrm>
-          <a:off x="0" y="0"/>
-          <a:ext cx="0" cy="0"/>
-          <a:chOff x="0" y="0"/>
-          <a:chExt cx="0" cy="0"/>
-        </a:xfrm>
-      </p:grpSpPr>
-      <p:pic>
-        <p:nvPicPr>
-          <p:cNvPr id="5" name="Picture 4">
-            <a:extLst>
-              <a:ext uri="{FF2B5EF4-FFF2-40B4-BE49-F238E27FC236}">
-                <a16:creationId xmlns="" xmlns:a16="http://schemas.microsoft.com/office/drawing/2014/main" id="{DA91ECD9-D840-1343-BEE5-F49A16B1CA91}"/>
-              </a:ext>
-            </a:extLst>
-          </p:cNvPr>
-          <p:cNvPicPr>
-            <a:picLocks noChangeAspect="1"/>
-          </p:cNvPicPr>
-          <p:nvPr/>
-        </p:nvPicPr>
-        <p:blipFill>
-          <a:blip r:embed="rId2"/>
-          <a:stretch>
-            <a:fillRect/>
-          </a:stretch>
-        </p:blipFill>
-        <p:spPr>
-          <a:xfrm>
-            <a:off x="58882" y="494025"/>
-            <a:ext cx="3748347" cy="3748347"/>
-          </a:xfrm>
-          <a:prstGeom prst="rect">
-            <a:avLst/>
-          </a:prstGeom>
-        </p:spPr>
-      </p:pic>
-      <p:pic>
-        <p:nvPicPr>
-          <p:cNvPr id="2" name="Picture 1">
-            <a:extLst>
-              <a:ext uri="{FF2B5EF4-FFF2-40B4-BE49-F238E27FC236}">
-                <a16:creationId xmlns="" xmlns:a16="http://schemas.microsoft.com/office/drawing/2014/main" id="{CFB03B4F-763D-3F40-BBEF-EF908B158904}"/>
-              </a:ext>
-            </a:extLst>
-          </p:cNvPr>
-          <p:cNvPicPr>
-            <a:picLocks noChangeAspect="1"/>
-          </p:cNvPicPr>
-          <p:nvPr/>
-        </p:nvPicPr>
-        <p:blipFill>
-          <a:blip r:embed="rId3"/>
-          <a:stretch>
-            <a:fillRect/>
-          </a:stretch>
-        </p:blipFill>
-        <p:spPr>
-          <a:xfrm>
-            <a:off x="4081550" y="494025"/>
-            <a:ext cx="3770526" cy="3748347"/>
-          </a:xfrm>
-          <a:prstGeom prst="rect">
-            <a:avLst/>
-          </a:prstGeom>
-        </p:spPr>
-      </p:pic>
-      <p:sp>
-        <p:nvSpPr>
-          <p:cNvPr id="7" name="TextBox 6">
-            <a:extLst>
-              <a:ext uri="{FF2B5EF4-FFF2-40B4-BE49-F238E27FC236}">
-                <a16:creationId xmlns="" xmlns:a16="http://schemas.microsoft.com/office/drawing/2014/main" id="{D6522514-518E-D94A-AF9A-6B4D99F5691D}"/>
-              </a:ext>
-            </a:extLst>
-          </p:cNvPr>
-          <p:cNvSpPr txBox="1"/>
-          <p:nvPr/>
-        </p:nvSpPr>
-        <p:spPr>
-          <a:xfrm rot="16200000">
-            <a:off x="3624982" y="1308038"/>
-            <a:ext cx="1251689" cy="338554"/>
-          </a:xfrm>
-          <a:prstGeom prst="rect">
-            <a:avLst/>
-          </a:prstGeom>
-          <a:noFill/>
-        </p:spPr>
-        <p:txBody>
-          <a:bodyPr wrap="none" rtlCol="0">
-            <a:spAutoFit/>
-          </a:bodyPr>
-          <a:lstStyle/>
-          <a:p>
-            <a:r>
-              <a:rPr lang="en-US" sz="1600" dirty="0"/>
-              <a:t>Waiting time</a:t>
-            </a:r>
-          </a:p>
-        </p:txBody>
-      </p:sp>
-      <p:sp>
-        <p:nvSpPr>
-          <p:cNvPr id="9" name="TextBox 8">
-            <a:extLst>
-              <a:ext uri="{FF2B5EF4-FFF2-40B4-BE49-F238E27FC236}">
-                <a16:creationId xmlns="" xmlns:a16="http://schemas.microsoft.com/office/drawing/2014/main" id="{BBD486EA-EF24-F14F-B6E9-1D13AFFBE9CD}"/>
-              </a:ext>
-            </a:extLst>
-          </p:cNvPr>
-          <p:cNvSpPr txBox="1"/>
-          <p:nvPr/>
-        </p:nvSpPr>
-        <p:spPr>
-          <a:xfrm>
-            <a:off x="1988037" y="3843053"/>
-            <a:ext cx="1660647" cy="338554"/>
-          </a:xfrm>
-          <a:prstGeom prst="rect">
-            <a:avLst/>
-          </a:prstGeom>
-          <a:noFill/>
-        </p:spPr>
-        <p:txBody>
-          <a:bodyPr wrap="none" rtlCol="0">
-            <a:spAutoFit/>
-          </a:bodyPr>
-          <a:lstStyle/>
-          <a:p>
-            <a:r>
-              <a:rPr lang="en-US" sz="1600" dirty="0"/>
-              <a:t>Eruption </a:t>
-            </a:r>
-            <a:r>
-              <a:rPr lang="en-US" sz="1600" dirty="0" smtClean="0"/>
-              <a:t>duration</a:t>
-            </a:r>
-            <a:endParaRPr lang="en-US" sz="1600" dirty="0"/>
-          </a:p>
-        </p:txBody>
-      </p:sp>
-      <p:sp>
-        <p:nvSpPr>
-          <p:cNvPr id="10" name="TextBox 9">
-            <a:extLst>
-              <a:ext uri="{FF2B5EF4-FFF2-40B4-BE49-F238E27FC236}">
-                <a16:creationId xmlns="" xmlns:a16="http://schemas.microsoft.com/office/drawing/2014/main" id="{D9A5DDC0-EF07-4D48-89DC-8FC5A5F32B1E}"/>
-              </a:ext>
-            </a:extLst>
-          </p:cNvPr>
-          <p:cNvSpPr txBox="1"/>
-          <p:nvPr/>
-        </p:nvSpPr>
-        <p:spPr>
-          <a:xfrm rot="16200000">
-            <a:off x="-382296" y="1308039"/>
-            <a:ext cx="1251689" cy="338554"/>
-          </a:xfrm>
-          <a:prstGeom prst="rect">
-            <a:avLst/>
-          </a:prstGeom>
-          <a:noFill/>
-        </p:spPr>
-        <p:txBody>
-          <a:bodyPr wrap="none" rtlCol="0">
-            <a:spAutoFit/>
-          </a:bodyPr>
-          <a:lstStyle/>
-          <a:p>
-            <a:r>
-              <a:rPr lang="en-US" sz="1600" dirty="0"/>
-              <a:t>Waiting time</a:t>
-            </a:r>
-          </a:p>
-        </p:txBody>
-      </p:sp>
-      <p:pic>
-        <p:nvPicPr>
-          <p:cNvPr id="11" name="Picture 10">
-            <a:extLst>
-              <a:ext uri="{FF2B5EF4-FFF2-40B4-BE49-F238E27FC236}">
-                <a16:creationId xmlns="" xmlns:a16="http://schemas.microsoft.com/office/drawing/2014/main" id="{9C919A4F-55D9-1943-B981-DDD7376174FE}"/>
-              </a:ext>
-            </a:extLst>
-          </p:cNvPr>
-          <p:cNvPicPr>
-            <a:picLocks noChangeAspect="1"/>
-          </p:cNvPicPr>
-          <p:nvPr/>
-        </p:nvPicPr>
-        <p:blipFill>
-          <a:blip r:embed="rId4"/>
-          <a:stretch>
-            <a:fillRect/>
-          </a:stretch>
-        </p:blipFill>
-        <p:spPr>
-          <a:xfrm>
-            <a:off x="8126396" y="488542"/>
-            <a:ext cx="3753829" cy="3753829"/>
-          </a:xfrm>
-          <a:prstGeom prst="rect">
-            <a:avLst/>
-          </a:prstGeom>
-        </p:spPr>
-      </p:pic>
-      <p:sp>
-        <p:nvSpPr>
-          <p:cNvPr id="13" name="TextBox 12">
-            <a:extLst>
-              <a:ext uri="{FF2B5EF4-FFF2-40B4-BE49-F238E27FC236}">
-                <a16:creationId xmlns="" xmlns:a16="http://schemas.microsoft.com/office/drawing/2014/main" id="{D6522514-518E-D94A-AF9A-6B4D99F5691D}"/>
-              </a:ext>
-            </a:extLst>
-          </p:cNvPr>
-          <p:cNvSpPr txBox="1"/>
-          <p:nvPr/>
-        </p:nvSpPr>
-        <p:spPr>
-          <a:xfrm rot="16200000">
-            <a:off x="7669829" y="1308038"/>
-            <a:ext cx="1251689" cy="338554"/>
-          </a:xfrm>
-          <a:prstGeom prst="rect">
-            <a:avLst/>
-          </a:prstGeom>
-          <a:noFill/>
-        </p:spPr>
-        <p:txBody>
-          <a:bodyPr wrap="none" rtlCol="0">
-            <a:spAutoFit/>
-          </a:bodyPr>
-          <a:lstStyle/>
-          <a:p>
-            <a:r>
-              <a:rPr lang="en-US" sz="1600" dirty="0"/>
-              <a:t>Waiting time</a:t>
-            </a:r>
-          </a:p>
-        </p:txBody>
-      </p:sp>
-      <p:sp>
-        <p:nvSpPr>
-          <p:cNvPr id="14" name="TextBox 13">
-            <a:extLst>
-              <a:ext uri="{FF2B5EF4-FFF2-40B4-BE49-F238E27FC236}">
-                <a16:creationId xmlns="" xmlns:a16="http://schemas.microsoft.com/office/drawing/2014/main" id="{BBD486EA-EF24-F14F-B6E9-1D13AFFBE9CD}"/>
-              </a:ext>
-            </a:extLst>
-          </p:cNvPr>
-          <p:cNvSpPr txBox="1"/>
-          <p:nvPr/>
-        </p:nvSpPr>
-        <p:spPr>
-          <a:xfrm>
-            <a:off x="5966813" y="3843053"/>
-            <a:ext cx="1660647" cy="338554"/>
-          </a:xfrm>
-          <a:prstGeom prst="rect">
-            <a:avLst/>
-          </a:prstGeom>
-          <a:noFill/>
-        </p:spPr>
-        <p:txBody>
-          <a:bodyPr wrap="none" rtlCol="0">
-            <a:spAutoFit/>
-          </a:bodyPr>
-          <a:lstStyle/>
-          <a:p>
-            <a:r>
-              <a:rPr lang="en-US" sz="1600" dirty="0"/>
-              <a:t>Eruption </a:t>
-            </a:r>
-            <a:r>
-              <a:rPr lang="en-US" sz="1600" dirty="0" smtClean="0"/>
-              <a:t>duration</a:t>
-            </a:r>
-            <a:endParaRPr lang="en-US" sz="1600" dirty="0"/>
-          </a:p>
-        </p:txBody>
-      </p:sp>
-      <p:sp>
-        <p:nvSpPr>
-          <p:cNvPr id="15" name="TextBox 14">
-            <a:extLst>
-              <a:ext uri="{FF2B5EF4-FFF2-40B4-BE49-F238E27FC236}">
-                <a16:creationId xmlns="" xmlns:a16="http://schemas.microsoft.com/office/drawing/2014/main" id="{BBD486EA-EF24-F14F-B6E9-1D13AFFBE9CD}"/>
-              </a:ext>
-            </a:extLst>
-          </p:cNvPr>
-          <p:cNvSpPr txBox="1"/>
-          <p:nvPr/>
-        </p:nvSpPr>
-        <p:spPr>
-          <a:xfrm>
-            <a:off x="10153906" y="3843053"/>
-            <a:ext cx="1660647" cy="338554"/>
-          </a:xfrm>
-          <a:prstGeom prst="rect">
-            <a:avLst/>
-          </a:prstGeom>
-          <a:noFill/>
-        </p:spPr>
-        <p:txBody>
-          <a:bodyPr wrap="none" rtlCol="0">
-            <a:spAutoFit/>
-          </a:bodyPr>
-          <a:lstStyle/>
-          <a:p>
-            <a:r>
-              <a:rPr lang="en-US" sz="1600" dirty="0"/>
-              <a:t>Eruption </a:t>
-            </a:r>
-            <a:r>
-              <a:rPr lang="en-US" sz="1600" dirty="0" smtClean="0"/>
-              <a:t>duration</a:t>
-            </a:r>
-            <a:endParaRPr lang="en-US" sz="1600" dirty="0"/>
-          </a:p>
-        </p:txBody>
-      </p:sp>
-      <p:sp>
-        <p:nvSpPr>
-          <p:cNvPr id="16" name="TextBox 15">
-            <a:extLst>
-              <a:ext uri="{FF2B5EF4-FFF2-40B4-BE49-F238E27FC236}">
-                <a16:creationId xmlns="" xmlns:a16="http://schemas.microsoft.com/office/drawing/2014/main" id="{0798B99F-FCE0-7747-9AD4-297C36E91E7F}"/>
-              </a:ext>
-            </a:extLst>
-          </p:cNvPr>
-          <p:cNvSpPr txBox="1"/>
-          <p:nvPr/>
-        </p:nvSpPr>
-        <p:spPr>
-          <a:xfrm>
-            <a:off x="1778169" y="4134304"/>
-            <a:ext cx="574196" cy="523220"/>
-          </a:xfrm>
-          <a:prstGeom prst="rect">
-            <a:avLst/>
-          </a:prstGeom>
-          <a:noFill/>
-        </p:spPr>
-        <p:txBody>
-          <a:bodyPr wrap="none" rtlCol="0">
-            <a:spAutoFit/>
-          </a:bodyPr>
-          <a:lstStyle/>
-          <a:p>
-            <a:r>
-              <a:rPr lang="en-US" sz="2800" dirty="0" smtClean="0"/>
-              <a:t>(a)</a:t>
-            </a:r>
-            <a:endParaRPr lang="en-US" sz="2800" dirty="0"/>
-          </a:p>
-        </p:txBody>
-      </p:sp>
-      <p:sp>
-        <p:nvSpPr>
-          <p:cNvPr id="17" name="TextBox 16">
-            <a:extLst>
-              <a:ext uri="{FF2B5EF4-FFF2-40B4-BE49-F238E27FC236}">
-                <a16:creationId xmlns="" xmlns:a16="http://schemas.microsoft.com/office/drawing/2014/main" id="{0798B99F-FCE0-7747-9AD4-297C36E91E7F}"/>
-              </a:ext>
-            </a:extLst>
-          </p:cNvPr>
-          <p:cNvSpPr txBox="1"/>
-          <p:nvPr/>
-        </p:nvSpPr>
-        <p:spPr>
-          <a:xfrm>
-            <a:off x="5670898" y="4151201"/>
-            <a:ext cx="591829" cy="523220"/>
-          </a:xfrm>
-          <a:prstGeom prst="rect">
-            <a:avLst/>
-          </a:prstGeom>
-          <a:noFill/>
-        </p:spPr>
-        <p:txBody>
-          <a:bodyPr wrap="none" rtlCol="0">
-            <a:spAutoFit/>
-          </a:bodyPr>
-          <a:lstStyle/>
-          <a:p>
-            <a:r>
-              <a:rPr lang="en-US" sz="2800" dirty="0" smtClean="0"/>
-              <a:t>(b)</a:t>
-            </a:r>
-            <a:endParaRPr lang="en-US" sz="2800" dirty="0"/>
-          </a:p>
-        </p:txBody>
-      </p:sp>
-      <p:sp>
-        <p:nvSpPr>
-          <p:cNvPr id="18" name="TextBox 17">
-            <a:extLst>
-              <a:ext uri="{FF2B5EF4-FFF2-40B4-BE49-F238E27FC236}">
-                <a16:creationId xmlns="" xmlns:a16="http://schemas.microsoft.com/office/drawing/2014/main" id="{0798B99F-FCE0-7747-9AD4-297C36E91E7F}"/>
-              </a:ext>
-            </a:extLst>
-          </p:cNvPr>
-          <p:cNvSpPr txBox="1"/>
-          <p:nvPr/>
-        </p:nvSpPr>
-        <p:spPr>
-          <a:xfrm>
-            <a:off x="9810754" y="4151201"/>
-            <a:ext cx="554960" cy="523220"/>
-          </a:xfrm>
-          <a:prstGeom prst="rect">
-            <a:avLst/>
-          </a:prstGeom>
-          <a:noFill/>
-        </p:spPr>
-        <p:txBody>
-          <a:bodyPr wrap="none" rtlCol="0">
-            <a:spAutoFit/>
-          </a:bodyPr>
-          <a:lstStyle/>
-          <a:p>
-            <a:r>
-              <a:rPr lang="en-US" sz="2800" dirty="0" smtClean="0"/>
-              <a:t>(c)</a:t>
-            </a:r>
-            <a:endParaRPr lang="en-US" sz="2800" dirty="0"/>
-          </a:p>
-        </p:txBody>
-      </p:sp>
-      <p:sp>
-        <p:nvSpPr>
-          <p:cNvPr id="19" name="Rectangle 18"/>
-          <p:cNvSpPr/>
-          <p:nvPr/>
-        </p:nvSpPr>
-        <p:spPr>
-          <a:xfrm>
-            <a:off x="1069930" y="102584"/>
-            <a:ext cx="1555426" cy="400110"/>
-          </a:xfrm>
-          <a:prstGeom prst="rect">
-            <a:avLst/>
-          </a:prstGeom>
-        </p:spPr>
-        <p:txBody>
-          <a:bodyPr wrap="none">
-            <a:spAutoFit/>
-          </a:bodyPr>
-          <a:lstStyle/>
-          <a:p>
-            <a:r>
-              <a:rPr lang="en-US" sz="2000" b="1" dirty="0" smtClean="0"/>
-              <a:t>Original data</a:t>
-            </a:r>
-            <a:endParaRPr lang="en-US" sz="2000" b="1" dirty="0"/>
-          </a:p>
-        </p:txBody>
-      </p:sp>
-      <p:sp>
-        <p:nvSpPr>
-          <p:cNvPr id="20" name="Rectangle 19"/>
-          <p:cNvSpPr/>
-          <p:nvPr/>
-        </p:nvSpPr>
-        <p:spPr>
-          <a:xfrm>
-            <a:off x="5145578" y="88432"/>
-            <a:ext cx="1971630" cy="400110"/>
-          </a:xfrm>
-          <a:prstGeom prst="rect">
-            <a:avLst/>
-          </a:prstGeom>
-        </p:spPr>
-        <p:txBody>
-          <a:bodyPr wrap="none">
-            <a:spAutoFit/>
-          </a:bodyPr>
-          <a:lstStyle/>
-          <a:p>
-            <a:r>
-              <a:rPr lang="en-US" sz="2000" b="1" dirty="0" smtClean="0"/>
-              <a:t>Hexagon Binning</a:t>
-            </a:r>
-            <a:endParaRPr lang="en-US" sz="2000" b="1" dirty="0"/>
-          </a:p>
-        </p:txBody>
-      </p:sp>
-      <p:sp>
-        <p:nvSpPr>
-          <p:cNvPr id="21" name="Rectangle 20"/>
-          <p:cNvSpPr/>
-          <p:nvPr/>
-        </p:nvSpPr>
-        <p:spPr>
-          <a:xfrm>
-            <a:off x="9117490" y="105058"/>
-            <a:ext cx="1771639" cy="400110"/>
-          </a:xfrm>
-          <a:prstGeom prst="rect">
-            <a:avLst/>
-          </a:prstGeom>
-        </p:spPr>
-        <p:txBody>
-          <a:bodyPr wrap="none">
-            <a:spAutoFit/>
-          </a:bodyPr>
-          <a:lstStyle/>
-          <a:p>
-            <a:r>
-              <a:rPr lang="en-US" sz="2000" b="1" dirty="0" smtClean="0"/>
-              <a:t>Leader Binning</a:t>
-            </a:r>
-            <a:endParaRPr lang="en-US" sz="2000" b="1" dirty="0"/>
-          </a:p>
-        </p:txBody>
-      </p:sp>
-    </p:spTree>
-    <p:extLst>
-      <p:ext uri="{BB962C8B-B14F-4D97-AF65-F5344CB8AC3E}">
-        <p14:creationId xmlns:p14="http://schemas.microsoft.com/office/powerpoint/2010/main" val="36231481"/>
-      </p:ext>
-    </p:extLst>
-  </p:cSld>
-  <p:clrMapOvr>
-    <a:masterClrMapping/>
-  </p:clrMapOvr>
-  <p:timing>
-    <p:tnLst>
-      <p:par>
-        <p:cTn id="1" dur="indefinite" restart="never" nodeType="tmRoot"/>
-      </p:par>
-    </p:tnLst>
-  </p:timing>
-</p:sld>
-</file>
-
-<file path=ppt/slides/slide3.xml><?xml version="1.0" encoding="utf-8"?>
-<p:sld xmlns:a="http://schemas.openxmlformats.org/drawingml/2006/main" xmlns:r="http://schemas.openxmlformats.org/officeDocument/2006/relationships" xmlns:p="http://schemas.openxmlformats.org/presentationml/2006/main">
-  <p:cSld>
-    <p:spTree>
-      <p:nvGrpSpPr>
-        <p:cNvPr id="1" name=""/>
-        <p:cNvGrpSpPr/>
-        <p:nvPr/>
-      </p:nvGrpSpPr>
-      <p:grpSpPr>
-        <a:xfrm>
-          <a:off x="0" y="0"/>
-          <a:ext cx="0" cy="0"/>
-          <a:chOff x="0" y="0"/>
-          <a:chExt cx="0" cy="0"/>
-        </a:xfrm>
-      </p:grpSpPr>
-      <p:pic>
-        <p:nvPicPr>
-          <p:cNvPr id="5" name="Picture 4">
-            <a:extLst>
-              <a:ext uri="{FF2B5EF4-FFF2-40B4-BE49-F238E27FC236}">
-                <a16:creationId xmlns="" xmlns:a16="http://schemas.microsoft.com/office/drawing/2014/main" id="{DA91ECD9-D840-1343-BEE5-F49A16B1CA91}"/>
-              </a:ext>
-            </a:extLst>
-          </p:cNvPr>
-          <p:cNvPicPr>
-            <a:picLocks noChangeAspect="1"/>
-          </p:cNvPicPr>
-          <p:nvPr/>
-        </p:nvPicPr>
-        <p:blipFill>
-          <a:blip r:embed="rId2"/>
-          <a:stretch>
-            <a:fillRect/>
-          </a:stretch>
-        </p:blipFill>
-        <p:spPr>
-          <a:xfrm>
-            <a:off x="358140" y="1104900"/>
-            <a:ext cx="4846320" cy="4846320"/>
-          </a:xfrm>
-          <a:prstGeom prst="rect">
-            <a:avLst/>
-          </a:prstGeom>
-        </p:spPr>
-      </p:pic>
-      <p:pic>
-        <p:nvPicPr>
-          <p:cNvPr id="6" name="Picture 5">
-            <a:extLst>
-              <a:ext uri="{FF2B5EF4-FFF2-40B4-BE49-F238E27FC236}">
-                <a16:creationId xmlns="" xmlns:a16="http://schemas.microsoft.com/office/drawing/2014/main" id="{9C919A4F-55D9-1943-B981-DDD7376174FE}"/>
-              </a:ext>
-            </a:extLst>
-          </p:cNvPr>
-          <p:cNvPicPr>
-            <a:picLocks noChangeAspect="1"/>
-          </p:cNvPicPr>
-          <p:nvPr/>
-        </p:nvPicPr>
-        <p:blipFill>
-          <a:blip r:embed="rId3"/>
-          <a:stretch>
-            <a:fillRect/>
-          </a:stretch>
-        </p:blipFill>
-        <p:spPr>
-          <a:xfrm>
-            <a:off x="7063740" y="1104900"/>
-            <a:ext cx="4846320" cy="4846320"/>
-          </a:xfrm>
-          <a:prstGeom prst="rect">
-            <a:avLst/>
-          </a:prstGeom>
-        </p:spPr>
-      </p:pic>
-      <p:sp>
-        <p:nvSpPr>
-          <p:cNvPr id="8" name="Right Arrow 7">
-            <a:extLst>
-              <a:ext uri="{FF2B5EF4-FFF2-40B4-BE49-F238E27FC236}">
-                <a16:creationId xmlns="" xmlns:a16="http://schemas.microsoft.com/office/drawing/2014/main" id="{E31B50BC-A6BA-554E-8AA1-9C6E171DC16F}"/>
-              </a:ext>
-            </a:extLst>
-          </p:cNvPr>
-          <p:cNvSpPr/>
-          <p:nvPr/>
-        </p:nvSpPr>
-        <p:spPr>
-          <a:xfrm>
-            <a:off x="5375910" y="2933700"/>
-            <a:ext cx="1516380" cy="297180"/>
-          </a:xfrm>
-          <a:prstGeom prst="rightArrow">
-            <a:avLst/>
-          </a:prstGeom>
-          <a:scene3d>
-            <a:camera prst="orthographicFront"/>
-            <a:lightRig rig="threePt" dir="t"/>
-          </a:scene3d>
-          <a:sp3d>
-            <a:bevelT prst="angle"/>
-          </a:sp3d>
-        </p:spPr>
-        <p:style>
-          <a:lnRef idx="2">
-            <a:schemeClr val="accent1">
-              <a:shade val="50000"/>
-            </a:schemeClr>
-          </a:lnRef>
-          <a:fillRef idx="1">
-            <a:schemeClr val="accent1"/>
-          </a:fillRef>
-          <a:effectRef idx="0">
-            <a:schemeClr val="accent1"/>
-          </a:effectRef>
-          <a:fontRef idx="minor">
-            <a:schemeClr val="lt1"/>
-          </a:fontRef>
-        </p:style>
-        <p:txBody>
-          <a:bodyPr rtlCol="0" anchor="ctr"/>
-          <a:lstStyle/>
-          <a:p>
-            <a:pPr algn="ctr"/>
-            <a:endParaRPr lang="en-US" dirty="0"/>
-          </a:p>
-        </p:txBody>
-      </p:sp>
-      <p:sp>
-        <p:nvSpPr>
-          <p:cNvPr id="9" name="TextBox 8">
-            <a:extLst>
-              <a:ext uri="{FF2B5EF4-FFF2-40B4-BE49-F238E27FC236}">
-                <a16:creationId xmlns="" xmlns:a16="http://schemas.microsoft.com/office/drawing/2014/main" id="{5FE067EA-D1CA-CF44-86B4-53E19073F857}"/>
-              </a:ext>
-            </a:extLst>
-          </p:cNvPr>
-          <p:cNvSpPr txBox="1"/>
-          <p:nvPr/>
-        </p:nvSpPr>
-        <p:spPr>
-          <a:xfrm>
-            <a:off x="8749070" y="5581888"/>
-            <a:ext cx="1475660" cy="369332"/>
-          </a:xfrm>
-          <a:prstGeom prst="rect">
-            <a:avLst/>
-          </a:prstGeom>
-          <a:noFill/>
-        </p:spPr>
-        <p:txBody>
-          <a:bodyPr wrap="none" rtlCol="0">
-            <a:spAutoFit/>
-          </a:bodyPr>
-          <a:lstStyle/>
-          <a:p>
-            <a:r>
-              <a:rPr lang="en-US" dirty="0"/>
-              <a:t>Eruption time</a:t>
-            </a:r>
-          </a:p>
-        </p:txBody>
-      </p:sp>
-      <p:sp>
-        <p:nvSpPr>
-          <p:cNvPr id="10" name="TextBox 9">
-            <a:extLst>
-              <a:ext uri="{FF2B5EF4-FFF2-40B4-BE49-F238E27FC236}">
-                <a16:creationId xmlns="" xmlns:a16="http://schemas.microsoft.com/office/drawing/2014/main" id="{4B85DE99-C36B-314A-A1ED-E33F1B836CBF}"/>
-              </a:ext>
-            </a:extLst>
-          </p:cNvPr>
-          <p:cNvSpPr txBox="1"/>
-          <p:nvPr/>
-        </p:nvSpPr>
-        <p:spPr>
-          <a:xfrm rot="16200000">
-            <a:off x="6554145" y="2897624"/>
-            <a:ext cx="1388522" cy="369332"/>
-          </a:xfrm>
-          <a:prstGeom prst="rect">
-            <a:avLst/>
-          </a:prstGeom>
-          <a:noFill/>
-        </p:spPr>
-        <p:txBody>
-          <a:bodyPr wrap="none" rtlCol="0">
-            <a:spAutoFit/>
-          </a:bodyPr>
-          <a:lstStyle/>
-          <a:p>
-            <a:r>
-              <a:rPr lang="en-US" dirty="0"/>
-              <a:t>Waiting time</a:t>
-            </a:r>
-          </a:p>
-        </p:txBody>
-      </p:sp>
-      <p:sp>
-        <p:nvSpPr>
-          <p:cNvPr id="11" name="TextBox 10">
-            <a:extLst>
-              <a:ext uri="{FF2B5EF4-FFF2-40B4-BE49-F238E27FC236}">
-                <a16:creationId xmlns="" xmlns:a16="http://schemas.microsoft.com/office/drawing/2014/main" id="{3C190518-5E00-584E-9EA4-D3D053F8584C}"/>
-              </a:ext>
-            </a:extLst>
-          </p:cNvPr>
-          <p:cNvSpPr txBox="1"/>
-          <p:nvPr/>
-        </p:nvSpPr>
-        <p:spPr>
-          <a:xfrm>
-            <a:off x="2129195" y="5581888"/>
-            <a:ext cx="1475660" cy="369332"/>
-          </a:xfrm>
-          <a:prstGeom prst="rect">
-            <a:avLst/>
-          </a:prstGeom>
-          <a:noFill/>
-        </p:spPr>
-        <p:txBody>
-          <a:bodyPr wrap="none" rtlCol="0">
-            <a:spAutoFit/>
-          </a:bodyPr>
-          <a:lstStyle/>
-          <a:p>
-            <a:r>
-              <a:rPr lang="en-US" dirty="0"/>
-              <a:t>Eruption time</a:t>
-            </a:r>
-          </a:p>
-        </p:txBody>
-      </p:sp>
-      <p:sp>
-        <p:nvSpPr>
-          <p:cNvPr id="12" name="TextBox 11">
-            <a:extLst>
-              <a:ext uri="{FF2B5EF4-FFF2-40B4-BE49-F238E27FC236}">
-                <a16:creationId xmlns="" xmlns:a16="http://schemas.microsoft.com/office/drawing/2014/main" id="{844623FB-E970-C54A-B92A-82106CD3A11B}"/>
-              </a:ext>
-            </a:extLst>
-          </p:cNvPr>
-          <p:cNvSpPr txBox="1"/>
-          <p:nvPr/>
-        </p:nvSpPr>
-        <p:spPr>
-          <a:xfrm rot="16200000">
-            <a:off x="-151455" y="2755690"/>
-            <a:ext cx="1388522" cy="369332"/>
-          </a:xfrm>
-          <a:prstGeom prst="rect">
-            <a:avLst/>
-          </a:prstGeom>
-          <a:noFill/>
-        </p:spPr>
-        <p:txBody>
-          <a:bodyPr wrap="none" rtlCol="0">
-            <a:spAutoFit/>
-          </a:bodyPr>
-          <a:lstStyle/>
-          <a:p>
-            <a:r>
-              <a:rPr lang="en-US" dirty="0"/>
-              <a:t>Waiting time</a:t>
-            </a:r>
-          </a:p>
-        </p:txBody>
-      </p:sp>
-    </p:spTree>
-    <p:extLst>
-      <p:ext uri="{BB962C8B-B14F-4D97-AF65-F5344CB8AC3E}">
-        <p14:creationId xmlns:p14="http://schemas.microsoft.com/office/powerpoint/2010/main" val="1204629066"/>
       </p:ext>
     </p:extLst>
   </p:cSld>

</xml_diff>